<commit_message>
Create VAP tab in Netlify.
</commit_message>
<xml_diff>
--- a/_site/UserGuide/images/imagecreator.pptx
+++ b/_site/UserGuide/images/imagecreator.pptx
@@ -5,8 +5,10 @@
     <p:sldMasterId id="2147483648" r:id="rId1"/>
   </p:sldMasterIdLst>
   <p:sldIdLst>
-    <p:sldId id="256" r:id="rId2"/>
-    <p:sldId id="257" r:id="rId3"/>
+    <p:sldId id="260" r:id="rId2"/>
+    <p:sldId id="261" r:id="rId3"/>
+    <p:sldId id="258" r:id="rId4"/>
+    <p:sldId id="259" r:id="rId5"/>
   </p:sldIdLst>
   <p:sldSz cx="12192000" cy="6858000"/>
   <p:notesSz cx="6858000" cy="9144000"/>
@@ -105,6 +107,11 @@
       </a:defRPr>
     </a:lvl9pPr>
   </p:defaultTextStyle>
+  <p:extLst>
+    <p:ext uri="{EFAFB233-063F-42B5-8137-9DF3F51BA10A}">
+      <p15:sldGuideLst xmlns:p15="http://schemas.microsoft.com/office/powerpoint/2012/main"/>
+    </p:ext>
+  </p:extLst>
 </p:presentation>
 </file>
 
@@ -257,7 +264,7 @@
           <a:p>
             <a:fld id="{DB26C42C-C92D-46AB-AC85-EDA52E7266AD}" type="datetimeFigureOut">
               <a:rPr lang="en-SG" smtClean="0"/>
-              <a:t>18/4/2021</a:t>
+              <a:t>23/4/2021</a:t>
             </a:fld>
             <a:endParaRPr lang="en-SG"/>
           </a:p>
@@ -457,7 +464,7 @@
           <a:p>
             <a:fld id="{DB26C42C-C92D-46AB-AC85-EDA52E7266AD}" type="datetimeFigureOut">
               <a:rPr lang="en-SG" smtClean="0"/>
-              <a:t>18/4/2021</a:t>
+              <a:t>23/4/2021</a:t>
             </a:fld>
             <a:endParaRPr lang="en-SG"/>
           </a:p>
@@ -667,7 +674,7 @@
           <a:p>
             <a:fld id="{DB26C42C-C92D-46AB-AC85-EDA52E7266AD}" type="datetimeFigureOut">
               <a:rPr lang="en-SG" smtClean="0"/>
-              <a:t>18/4/2021</a:t>
+              <a:t>23/4/2021</a:t>
             </a:fld>
             <a:endParaRPr lang="en-SG"/>
           </a:p>
@@ -867,7 +874,7 @@
           <a:p>
             <a:fld id="{DB26C42C-C92D-46AB-AC85-EDA52E7266AD}" type="datetimeFigureOut">
               <a:rPr lang="en-SG" smtClean="0"/>
-              <a:t>18/4/2021</a:t>
+              <a:t>23/4/2021</a:t>
             </a:fld>
             <a:endParaRPr lang="en-SG"/>
           </a:p>
@@ -1143,7 +1150,7 @@
           <a:p>
             <a:fld id="{DB26C42C-C92D-46AB-AC85-EDA52E7266AD}" type="datetimeFigureOut">
               <a:rPr lang="en-SG" smtClean="0"/>
-              <a:t>18/4/2021</a:t>
+              <a:t>23/4/2021</a:t>
             </a:fld>
             <a:endParaRPr lang="en-SG"/>
           </a:p>
@@ -1411,7 +1418,7 @@
           <a:p>
             <a:fld id="{DB26C42C-C92D-46AB-AC85-EDA52E7266AD}" type="datetimeFigureOut">
               <a:rPr lang="en-SG" smtClean="0"/>
-              <a:t>18/4/2021</a:t>
+              <a:t>23/4/2021</a:t>
             </a:fld>
             <a:endParaRPr lang="en-SG"/>
           </a:p>
@@ -1826,7 +1833,7 @@
           <a:p>
             <a:fld id="{DB26C42C-C92D-46AB-AC85-EDA52E7266AD}" type="datetimeFigureOut">
               <a:rPr lang="en-SG" smtClean="0"/>
-              <a:t>18/4/2021</a:t>
+              <a:t>23/4/2021</a:t>
             </a:fld>
             <a:endParaRPr lang="en-SG"/>
           </a:p>
@@ -1968,7 +1975,7 @@
           <a:p>
             <a:fld id="{DB26C42C-C92D-46AB-AC85-EDA52E7266AD}" type="datetimeFigureOut">
               <a:rPr lang="en-SG" smtClean="0"/>
-              <a:t>18/4/2021</a:t>
+              <a:t>23/4/2021</a:t>
             </a:fld>
             <a:endParaRPr lang="en-SG"/>
           </a:p>
@@ -2081,7 +2088,7 @@
           <a:p>
             <a:fld id="{DB26C42C-C92D-46AB-AC85-EDA52E7266AD}" type="datetimeFigureOut">
               <a:rPr lang="en-SG" smtClean="0"/>
-              <a:t>18/4/2021</a:t>
+              <a:t>23/4/2021</a:t>
             </a:fld>
             <a:endParaRPr lang="en-SG"/>
           </a:p>
@@ -2394,7 +2401,7 @@
           <a:p>
             <a:fld id="{DB26C42C-C92D-46AB-AC85-EDA52E7266AD}" type="datetimeFigureOut">
               <a:rPr lang="en-SG" smtClean="0"/>
-              <a:t>18/4/2021</a:t>
+              <a:t>23/4/2021</a:t>
             </a:fld>
             <a:endParaRPr lang="en-SG"/>
           </a:p>
@@ -2683,7 +2690,7 @@
           <a:p>
             <a:fld id="{DB26C42C-C92D-46AB-AC85-EDA52E7266AD}" type="datetimeFigureOut">
               <a:rPr lang="en-SG" smtClean="0"/>
-              <a:t>18/4/2021</a:t>
+              <a:t>23/4/2021</a:t>
             </a:fld>
             <a:endParaRPr lang="en-SG"/>
           </a:p>
@@ -2926,7 +2933,7 @@
           <a:p>
             <a:fld id="{DB26C42C-C92D-46AB-AC85-EDA52E7266AD}" type="datetimeFigureOut">
               <a:rPr lang="en-SG" smtClean="0"/>
-              <a:t>18/4/2021</a:t>
+              <a:t>23/4/2021</a:t>
             </a:fld>
             <a:endParaRPr lang="en-SG"/>
           </a:p>
@@ -3345,10 +3352,10 @@
       </p:grpSpPr>
       <p:pic>
         <p:nvPicPr>
-          <p:cNvPr id="5" name="Picture 4">
-            <a:extLst>
-              <a:ext uri="{FF2B5EF4-FFF2-40B4-BE49-F238E27FC236}">
-                <a16:creationId xmlns:a16="http://schemas.microsoft.com/office/drawing/2014/main" id="{AF3DAC82-AF5A-4C0B-88C6-AEE15F091C5B}"/>
+          <p:cNvPr id="13" name="Picture 12">
+            <a:extLst>
+              <a:ext uri="{FF2B5EF4-FFF2-40B4-BE49-F238E27FC236}">
+                <a16:creationId xmlns:a16="http://schemas.microsoft.com/office/drawing/2014/main" id="{FBE1841F-F7EF-40E0-9D21-C155E132B297}"/>
               </a:ext>
             </a:extLst>
           </p:cNvPr>
@@ -3357,16 +3364,15 @@
           </p:cNvPicPr>
           <p:nvPr/>
         </p:nvPicPr>
-        <p:blipFill>
+        <p:blipFill rotWithShape="1">
           <a:blip r:embed="rId2"/>
-          <a:stretch>
-            <a:fillRect/>
-          </a:stretch>
+          <a:srcRect b="15716"/>
+          <a:stretch/>
         </p:blipFill>
         <p:spPr>
           <a:xfrm>
-            <a:off x="3538211" y="0"/>
-            <a:ext cx="5115577" cy="6858000"/>
+            <a:off x="0" y="150693"/>
+            <a:ext cx="12192000" cy="5526208"/>
           </a:xfrm>
           <a:prstGeom prst="rect">
             <a:avLst/>
@@ -3375,10 +3381,10 @@
       </p:pic>
       <p:sp>
         <p:nvSpPr>
-          <p:cNvPr id="6" name="Rectangle 5">
-            <a:extLst>
-              <a:ext uri="{FF2B5EF4-FFF2-40B4-BE49-F238E27FC236}">
-                <a16:creationId xmlns:a16="http://schemas.microsoft.com/office/drawing/2014/main" id="{2436B9C8-5ED5-4750-9076-DAEC031527A9}"/>
+          <p:cNvPr id="8" name="Oval 7">
+            <a:extLst>
+              <a:ext uri="{FF2B5EF4-FFF2-40B4-BE49-F238E27FC236}">
+                <a16:creationId xmlns:a16="http://schemas.microsoft.com/office/drawing/2014/main" id="{232A94A2-0A4B-4AF4-87CE-AABA0D40AA71}"/>
               </a:ext>
             </a:extLst>
           </p:cNvPr>
@@ -3387,8 +3393,130 @@
         </p:nvSpPr>
         <p:spPr>
           <a:xfrm>
-            <a:off x="3884017" y="951979"/>
-            <a:ext cx="2105722" cy="566428"/>
+            <a:off x="1379858" y="1313225"/>
+            <a:ext cx="220470" cy="211750"/>
+          </a:xfrm>
+          <a:prstGeom prst="ellipse">
+            <a:avLst/>
+          </a:prstGeom>
+          <a:solidFill>
+            <a:schemeClr val="bg1"/>
+          </a:solidFill>
+          <a:ln w="12700">
+            <a:solidFill>
+              <a:schemeClr val="tx2"/>
+            </a:solidFill>
+          </a:ln>
+        </p:spPr>
+        <p:style>
+          <a:lnRef idx="2">
+            <a:schemeClr val="accent1">
+              <a:shade val="50000"/>
+            </a:schemeClr>
+          </a:lnRef>
+          <a:fillRef idx="1">
+            <a:schemeClr val="accent1"/>
+          </a:fillRef>
+          <a:effectRef idx="0">
+            <a:schemeClr val="accent1"/>
+          </a:effectRef>
+          <a:fontRef idx="minor">
+            <a:schemeClr val="lt1"/>
+          </a:fontRef>
+        </p:style>
+        <p:txBody>
+          <a:bodyPr rtlCol="0" anchor="ctr"/>
+          <a:lstStyle/>
+          <a:p>
+            <a:pPr algn="ctr"/>
+            <a:r>
+              <a:rPr lang="en-SG" sz="1600" dirty="0">
+                <a:solidFill>
+                  <a:schemeClr val="tx2"/>
+                </a:solidFill>
+              </a:rPr>
+              <a:t>1</a:t>
+            </a:r>
+          </a:p>
+        </p:txBody>
+      </p:sp>
+      <p:sp>
+        <p:nvSpPr>
+          <p:cNvPr id="9" name="Oval 8">
+            <a:extLst>
+              <a:ext uri="{FF2B5EF4-FFF2-40B4-BE49-F238E27FC236}">
+                <a16:creationId xmlns:a16="http://schemas.microsoft.com/office/drawing/2014/main" id="{65F1D0C4-4DB8-41B9-87D3-2B7BD53C6955}"/>
+              </a:ext>
+            </a:extLst>
+          </p:cNvPr>
+          <p:cNvSpPr/>
+          <p:nvPr/>
+        </p:nvSpPr>
+        <p:spPr>
+          <a:xfrm>
+            <a:off x="7495654" y="458027"/>
+            <a:ext cx="220470" cy="211750"/>
+          </a:xfrm>
+          <a:prstGeom prst="ellipse">
+            <a:avLst/>
+          </a:prstGeom>
+          <a:solidFill>
+            <a:schemeClr val="bg1"/>
+          </a:solidFill>
+          <a:ln w="12700">
+            <a:solidFill>
+              <a:schemeClr val="tx2"/>
+            </a:solidFill>
+          </a:ln>
+        </p:spPr>
+        <p:style>
+          <a:lnRef idx="2">
+            <a:schemeClr val="accent1">
+              <a:shade val="50000"/>
+            </a:schemeClr>
+          </a:lnRef>
+          <a:fillRef idx="1">
+            <a:schemeClr val="accent1"/>
+          </a:fillRef>
+          <a:effectRef idx="0">
+            <a:schemeClr val="accent1"/>
+          </a:effectRef>
+          <a:fontRef idx="minor">
+            <a:schemeClr val="lt1"/>
+          </a:fontRef>
+        </p:style>
+        <p:txBody>
+          <a:bodyPr rtlCol="0" anchor="ctr"/>
+          <a:lstStyle/>
+          <a:p>
+            <a:pPr algn="ctr"/>
+            <a:r>
+              <a:rPr lang="en-SG" sz="1600" dirty="0">
+                <a:solidFill>
+                  <a:schemeClr val="tx2"/>
+                </a:solidFill>
+              </a:rPr>
+              <a:t>2</a:t>
+            </a:r>
+          </a:p>
+        </p:txBody>
+      </p:sp>
+      <p:sp>
+        <p:nvSpPr>
+          <p:cNvPr id="10" name="Rectangle 9">
+            <a:extLst>
+              <a:ext uri="{FF2B5EF4-FFF2-40B4-BE49-F238E27FC236}">
+                <a16:creationId xmlns:a16="http://schemas.microsoft.com/office/drawing/2014/main" id="{A3C9CF08-3F41-4BA5-8B9F-D9D6EB3AC05B}"/>
+              </a:ext>
+            </a:extLst>
+          </p:cNvPr>
+          <p:cNvSpPr/>
+          <p:nvPr/>
+        </p:nvSpPr>
+        <p:spPr>
+          <a:xfrm>
+            <a:off x="1756793" y="1243766"/>
+            <a:ext cx="4977381" cy="518359"/>
           </a:xfrm>
           <a:prstGeom prst="rect">
             <a:avLst/>
@@ -3427,10 +3555,10 @@
       </p:sp>
       <p:sp>
         <p:nvSpPr>
-          <p:cNvPr id="7" name="Rectangle 6">
-            <a:extLst>
-              <a:ext uri="{FF2B5EF4-FFF2-40B4-BE49-F238E27FC236}">
-                <a16:creationId xmlns:a16="http://schemas.microsoft.com/office/drawing/2014/main" id="{70857BCF-2F26-4430-A62E-F00D4F76E6C2}"/>
+          <p:cNvPr id="11" name="Rectangle 10">
+            <a:extLst>
+              <a:ext uri="{FF2B5EF4-FFF2-40B4-BE49-F238E27FC236}">
+                <a16:creationId xmlns:a16="http://schemas.microsoft.com/office/drawing/2014/main" id="{FA602467-8BFA-4DF8-9A81-0189DE6BC8C6}"/>
               </a:ext>
             </a:extLst>
           </p:cNvPr>
@@ -3439,8 +3567,8 @@
         </p:nvSpPr>
         <p:spPr>
           <a:xfrm>
-            <a:off x="3884017" y="1528194"/>
-            <a:ext cx="2105722" cy="566428"/>
+            <a:off x="1756793" y="1762125"/>
+            <a:ext cx="4977381" cy="541941"/>
           </a:xfrm>
           <a:prstGeom prst="rect">
             <a:avLst/>
@@ -3477,10 +3605,223 @@
           </a:p>
         </p:txBody>
       </p:sp>
+      <p:pic>
+        <p:nvPicPr>
+          <p:cNvPr id="15" name="Picture 14">
+            <a:extLst>
+              <a:ext uri="{FF2B5EF4-FFF2-40B4-BE49-F238E27FC236}">
+                <a16:creationId xmlns:a16="http://schemas.microsoft.com/office/drawing/2014/main" id="{5D2E06AD-C4ED-48D2-88E3-38ADB4167443}"/>
+              </a:ext>
+            </a:extLst>
+          </p:cNvPr>
+          <p:cNvPicPr>
+            <a:picLocks noChangeAspect="1"/>
+          </p:cNvPicPr>
+          <p:nvPr/>
+        </p:nvPicPr>
+        <p:blipFill>
+          <a:blip r:embed="rId3"/>
+          <a:stretch>
+            <a:fillRect/>
+          </a:stretch>
+        </p:blipFill>
+        <p:spPr>
+          <a:xfrm>
+            <a:off x="7762354" y="260730"/>
+            <a:ext cx="4162946" cy="1497386"/>
+          </a:xfrm>
+          <a:prstGeom prst="rect">
+            <a:avLst/>
+          </a:prstGeom>
+        </p:spPr>
+      </p:pic>
+      <p:pic>
+        <p:nvPicPr>
+          <p:cNvPr id="17" name="Picture 16">
+            <a:extLst>
+              <a:ext uri="{FF2B5EF4-FFF2-40B4-BE49-F238E27FC236}">
+                <a16:creationId xmlns:a16="http://schemas.microsoft.com/office/drawing/2014/main" id="{965BB36E-167B-4085-A845-584172EE2F8B}"/>
+              </a:ext>
+            </a:extLst>
+          </p:cNvPr>
+          <p:cNvPicPr>
+            <a:picLocks noChangeAspect="1"/>
+          </p:cNvPicPr>
+          <p:nvPr/>
+        </p:nvPicPr>
+        <p:blipFill>
+          <a:blip r:embed="rId4"/>
+          <a:stretch>
+            <a:fillRect/>
+          </a:stretch>
+        </p:blipFill>
+        <p:spPr>
+          <a:xfrm>
+            <a:off x="7788944" y="1868153"/>
+            <a:ext cx="4109765" cy="1433393"/>
+          </a:xfrm>
+          <a:prstGeom prst="rect">
+            <a:avLst/>
+          </a:prstGeom>
+        </p:spPr>
+      </p:pic>
+      <p:cxnSp>
+        <p:nvCxnSpPr>
+          <p:cNvPr id="18" name="Straight Arrow Connector 17">
+            <a:extLst>
+              <a:ext uri="{FF2B5EF4-FFF2-40B4-BE49-F238E27FC236}">
+                <a16:creationId xmlns:a16="http://schemas.microsoft.com/office/drawing/2014/main" id="{D05E8162-809B-4988-A37D-7AC828492979}"/>
+              </a:ext>
+            </a:extLst>
+          </p:cNvPr>
+          <p:cNvCxnSpPr>
+            <a:cxnSpLocks/>
+            <a:stCxn id="10" idx="3"/>
+            <a:endCxn id="15" idx="1"/>
+          </p:cNvCxnSpPr>
+          <p:nvPr/>
+        </p:nvCxnSpPr>
+        <p:spPr>
+          <a:xfrm flipV="1">
+            <a:off x="6734174" y="1009423"/>
+            <a:ext cx="1028180" cy="493523"/>
+          </a:xfrm>
+          <a:prstGeom prst="straightConnector1">
+            <a:avLst/>
+          </a:prstGeom>
+          <a:ln w="28575">
+            <a:solidFill>
+              <a:srgbClr val="FF0000"/>
+            </a:solidFill>
+            <a:tailEnd type="triangle"/>
+          </a:ln>
+        </p:spPr>
+        <p:style>
+          <a:lnRef idx="1">
+            <a:schemeClr val="accent1"/>
+          </a:lnRef>
+          <a:fillRef idx="0">
+            <a:schemeClr val="accent1"/>
+          </a:fillRef>
+          <a:effectRef idx="0">
+            <a:schemeClr val="accent1"/>
+          </a:effectRef>
+          <a:fontRef idx="minor">
+            <a:schemeClr val="tx1"/>
+          </a:fontRef>
+        </p:style>
+      </p:cxnSp>
+      <p:cxnSp>
+        <p:nvCxnSpPr>
+          <p:cNvPr id="21" name="Straight Arrow Connector 20">
+            <a:extLst>
+              <a:ext uri="{FF2B5EF4-FFF2-40B4-BE49-F238E27FC236}">
+                <a16:creationId xmlns:a16="http://schemas.microsoft.com/office/drawing/2014/main" id="{39F5056A-E31F-4E6A-B3F5-EEC1C996CDF2}"/>
+              </a:ext>
+            </a:extLst>
+          </p:cNvPr>
+          <p:cNvCxnSpPr>
+            <a:cxnSpLocks/>
+            <a:stCxn id="11" idx="3"/>
+            <a:endCxn id="17" idx="1"/>
+          </p:cNvCxnSpPr>
+          <p:nvPr/>
+        </p:nvCxnSpPr>
+        <p:spPr>
+          <a:xfrm>
+            <a:off x="6734174" y="2033096"/>
+            <a:ext cx="1054770" cy="551754"/>
+          </a:xfrm>
+          <a:prstGeom prst="straightConnector1">
+            <a:avLst/>
+          </a:prstGeom>
+          <a:ln w="28575">
+            <a:solidFill>
+              <a:srgbClr val="FF0000"/>
+            </a:solidFill>
+            <a:tailEnd type="triangle"/>
+          </a:ln>
+        </p:spPr>
+        <p:style>
+          <a:lnRef idx="1">
+            <a:schemeClr val="accent1"/>
+          </a:lnRef>
+          <a:fillRef idx="0">
+            <a:schemeClr val="accent1"/>
+          </a:fillRef>
+          <a:effectRef idx="0">
+            <a:schemeClr val="accent1"/>
+          </a:effectRef>
+          <a:fontRef idx="minor">
+            <a:schemeClr val="tx1"/>
+          </a:fontRef>
+        </p:style>
+      </p:cxnSp>
+      <p:sp>
+        <p:nvSpPr>
+          <p:cNvPr id="24" name="Oval 23">
+            <a:extLst>
+              <a:ext uri="{FF2B5EF4-FFF2-40B4-BE49-F238E27FC236}">
+                <a16:creationId xmlns:a16="http://schemas.microsoft.com/office/drawing/2014/main" id="{09720BA7-1ED1-415A-BD8E-A4391FAE7D76}"/>
+              </a:ext>
+            </a:extLst>
+          </p:cNvPr>
+          <p:cNvSpPr/>
+          <p:nvPr/>
+        </p:nvSpPr>
+        <p:spPr>
+          <a:xfrm>
+            <a:off x="7531838" y="1911420"/>
+            <a:ext cx="220470" cy="211750"/>
+          </a:xfrm>
+          <a:prstGeom prst="ellipse">
+            <a:avLst/>
+          </a:prstGeom>
+          <a:solidFill>
+            <a:schemeClr val="bg1"/>
+          </a:solidFill>
+          <a:ln w="12700">
+            <a:solidFill>
+              <a:schemeClr val="tx2"/>
+            </a:solidFill>
+          </a:ln>
+        </p:spPr>
+        <p:style>
+          <a:lnRef idx="2">
+            <a:schemeClr val="accent1">
+              <a:shade val="50000"/>
+            </a:schemeClr>
+          </a:lnRef>
+          <a:fillRef idx="1">
+            <a:schemeClr val="accent1"/>
+          </a:fillRef>
+          <a:effectRef idx="0">
+            <a:schemeClr val="accent1"/>
+          </a:effectRef>
+          <a:fontRef idx="minor">
+            <a:schemeClr val="lt1"/>
+          </a:fontRef>
+        </p:style>
+        <p:txBody>
+          <a:bodyPr rtlCol="0" anchor="ctr"/>
+          <a:lstStyle/>
+          <a:p>
+            <a:pPr algn="ctr"/>
+            <a:r>
+              <a:rPr lang="en-SG" sz="1600" dirty="0">
+                <a:solidFill>
+                  <a:schemeClr val="tx2"/>
+                </a:solidFill>
+              </a:rPr>
+              <a:t>3</a:t>
+            </a:r>
+          </a:p>
+        </p:txBody>
+      </p:sp>
     </p:spTree>
     <p:extLst>
       <p:ext uri="{BB962C8B-B14F-4D97-AF65-F5344CB8AC3E}">
-        <p14:creationId xmlns:p14="http://schemas.microsoft.com/office/powerpoint/2010/main" val="1840759689"/>
+        <p14:creationId xmlns:p14="http://schemas.microsoft.com/office/powerpoint/2010/main" val="1769292577"/>
       </p:ext>
     </p:extLst>
   </p:cSld>
@@ -3512,7 +3853,7 @@
           <p:cNvPr id="5" name="Picture 4">
             <a:extLst>
               <a:ext uri="{FF2B5EF4-FFF2-40B4-BE49-F238E27FC236}">
-                <a16:creationId xmlns:a16="http://schemas.microsoft.com/office/drawing/2014/main" id="{226426FD-04C8-420D-8D19-D0A03AAD2C81}"/>
+                <a16:creationId xmlns:a16="http://schemas.microsoft.com/office/drawing/2014/main" id="{1CB52D9D-EC5F-479F-A6D2-9C9F365D970E}"/>
               </a:ext>
             </a:extLst>
           </p:cNvPr>
@@ -3529,8 +3870,8 @@
         </p:blipFill>
         <p:spPr>
           <a:xfrm>
-            <a:off x="3735456" y="0"/>
-            <a:ext cx="4721087" cy="6858000"/>
+            <a:off x="0" y="228441"/>
+            <a:ext cx="12192000" cy="6401118"/>
           </a:xfrm>
           <a:prstGeom prst="rect">
             <a:avLst/>
@@ -3542,7 +3883,7 @@
           <p:cNvPr id="6" name="Rectangle 5">
             <a:extLst>
               <a:ext uri="{FF2B5EF4-FFF2-40B4-BE49-F238E27FC236}">
-                <a16:creationId xmlns:a16="http://schemas.microsoft.com/office/drawing/2014/main" id="{82295A71-DD57-4ED8-B159-1E9493778364}"/>
+                <a16:creationId xmlns:a16="http://schemas.microsoft.com/office/drawing/2014/main" id="{BF360145-89E0-4819-B96F-FE70FCAB1D6A}"/>
               </a:ext>
             </a:extLst>
           </p:cNvPr>
@@ -3551,8 +3892,8 @@
         </p:nvSpPr>
         <p:spPr>
           <a:xfrm>
-            <a:off x="4061299" y="893713"/>
-            <a:ext cx="1966277" cy="566428"/>
+            <a:off x="1737743" y="1352551"/>
+            <a:ext cx="4977381" cy="461010"/>
           </a:xfrm>
           <a:prstGeom prst="rect">
             <a:avLst/>
@@ -3594,7 +3935,7 @@
           <p:cNvPr id="7" name="Rectangle 6">
             <a:extLst>
               <a:ext uri="{FF2B5EF4-FFF2-40B4-BE49-F238E27FC236}">
-                <a16:creationId xmlns:a16="http://schemas.microsoft.com/office/drawing/2014/main" id="{12B72121-F753-455E-943A-CBBEC3E60734}"/>
+                <a16:creationId xmlns:a16="http://schemas.microsoft.com/office/drawing/2014/main" id="{837E0D91-67AC-4356-A21E-27B1C025CBB0}"/>
               </a:ext>
             </a:extLst>
           </p:cNvPr>
@@ -3603,8 +3944,8 @@
         </p:nvSpPr>
         <p:spPr>
           <a:xfrm>
-            <a:off x="4061493" y="1460141"/>
-            <a:ext cx="1966277" cy="566428"/>
+            <a:off x="1737742" y="1809750"/>
+            <a:ext cx="4977381" cy="529589"/>
           </a:xfrm>
           <a:prstGeom prst="rect">
             <a:avLst/>
@@ -3646,7 +3987,7 @@
           <p:cNvPr id="8" name="Rectangle 7">
             <a:extLst>
               <a:ext uri="{FF2B5EF4-FFF2-40B4-BE49-F238E27FC236}">
-                <a16:creationId xmlns:a16="http://schemas.microsoft.com/office/drawing/2014/main" id="{DC3B92C7-6C01-4A77-93FB-2388CFE70CFE}"/>
+                <a16:creationId xmlns:a16="http://schemas.microsoft.com/office/drawing/2014/main" id="{212C3D47-9E77-4D95-8F4F-B2760874748E}"/>
               </a:ext>
             </a:extLst>
           </p:cNvPr>
@@ -3655,8 +3996,8 @@
         </p:nvSpPr>
         <p:spPr>
           <a:xfrm>
-            <a:off x="4061105" y="2027189"/>
-            <a:ext cx="1966277" cy="530274"/>
+            <a:off x="1737742" y="2339339"/>
+            <a:ext cx="4977381" cy="495300"/>
           </a:xfrm>
           <a:prstGeom prst="rect">
             <a:avLst/>
@@ -3698,7 +4039,7 @@
           <p:cNvPr id="9" name="Rectangle 8">
             <a:extLst>
               <a:ext uri="{FF2B5EF4-FFF2-40B4-BE49-F238E27FC236}">
-                <a16:creationId xmlns:a16="http://schemas.microsoft.com/office/drawing/2014/main" id="{D7B05CAE-3B6A-4F0B-8115-C11894827A8C}"/>
+                <a16:creationId xmlns:a16="http://schemas.microsoft.com/office/drawing/2014/main" id="{674643C9-56FD-4A41-BC4C-34D19C462212}"/>
               </a:ext>
             </a:extLst>
           </p:cNvPr>
@@ -3707,8 +4048,8 @@
         </p:nvSpPr>
         <p:spPr>
           <a:xfrm>
-            <a:off x="4061299" y="2555513"/>
-            <a:ext cx="1966277" cy="566428"/>
+            <a:off x="1737742" y="2834801"/>
+            <a:ext cx="4977381" cy="495300"/>
           </a:xfrm>
           <a:prstGeom prst="rect">
             <a:avLst/>
@@ -3745,10 +4086,2684 @@
           </a:p>
         </p:txBody>
       </p:sp>
+      <p:pic>
+        <p:nvPicPr>
+          <p:cNvPr id="11" name="Picture 10">
+            <a:extLst>
+              <a:ext uri="{FF2B5EF4-FFF2-40B4-BE49-F238E27FC236}">
+                <a16:creationId xmlns:a16="http://schemas.microsoft.com/office/drawing/2014/main" id="{0BE553DA-72B5-409F-B896-D0502AEBA861}"/>
+              </a:ext>
+            </a:extLst>
+          </p:cNvPr>
+          <p:cNvPicPr>
+            <a:picLocks noChangeAspect="1"/>
+          </p:cNvPicPr>
+          <p:nvPr/>
+        </p:nvPicPr>
+        <p:blipFill>
+          <a:blip r:embed="rId3"/>
+          <a:stretch>
+            <a:fillRect/>
+          </a:stretch>
+        </p:blipFill>
+        <p:spPr>
+          <a:xfrm>
+            <a:off x="7898864" y="319099"/>
+            <a:ext cx="4119043" cy="1490651"/>
+          </a:xfrm>
+          <a:prstGeom prst="rect">
+            <a:avLst/>
+          </a:prstGeom>
+        </p:spPr>
+      </p:pic>
+      <p:pic>
+        <p:nvPicPr>
+          <p:cNvPr id="13" name="Picture 12">
+            <a:extLst>
+              <a:ext uri="{FF2B5EF4-FFF2-40B4-BE49-F238E27FC236}">
+                <a16:creationId xmlns:a16="http://schemas.microsoft.com/office/drawing/2014/main" id="{67374A2F-31E3-46DF-9761-6728AA1E03F9}"/>
+              </a:ext>
+            </a:extLst>
+          </p:cNvPr>
+          <p:cNvPicPr>
+            <a:picLocks noChangeAspect="1"/>
+          </p:cNvPicPr>
+          <p:nvPr/>
+        </p:nvPicPr>
+        <p:blipFill>
+          <a:blip r:embed="rId4"/>
+          <a:stretch>
+            <a:fillRect/>
+          </a:stretch>
+        </p:blipFill>
+        <p:spPr>
+          <a:xfrm>
+            <a:off x="7898864" y="1929876"/>
+            <a:ext cx="4048642" cy="1415464"/>
+          </a:xfrm>
+          <a:prstGeom prst="rect">
+            <a:avLst/>
+          </a:prstGeom>
+        </p:spPr>
+      </p:pic>
+      <p:cxnSp>
+        <p:nvCxnSpPr>
+          <p:cNvPr id="14" name="Straight Arrow Connector 13">
+            <a:extLst>
+              <a:ext uri="{FF2B5EF4-FFF2-40B4-BE49-F238E27FC236}">
+                <a16:creationId xmlns:a16="http://schemas.microsoft.com/office/drawing/2014/main" id="{779D8118-5BBD-4C6C-A103-5EB4C818E2E9}"/>
+              </a:ext>
+            </a:extLst>
+          </p:cNvPr>
+          <p:cNvCxnSpPr>
+            <a:cxnSpLocks/>
+            <a:stCxn id="6" idx="3"/>
+            <a:endCxn id="11" idx="1"/>
+          </p:cNvCxnSpPr>
+          <p:nvPr/>
+        </p:nvCxnSpPr>
+        <p:spPr>
+          <a:xfrm flipV="1">
+            <a:off x="6715124" y="1064425"/>
+            <a:ext cx="1183740" cy="518631"/>
+          </a:xfrm>
+          <a:prstGeom prst="straightConnector1">
+            <a:avLst/>
+          </a:prstGeom>
+          <a:ln w="28575">
+            <a:solidFill>
+              <a:srgbClr val="FF0000"/>
+            </a:solidFill>
+            <a:tailEnd type="triangle"/>
+          </a:ln>
+        </p:spPr>
+        <p:style>
+          <a:lnRef idx="1">
+            <a:schemeClr val="accent1"/>
+          </a:lnRef>
+          <a:fillRef idx="0">
+            <a:schemeClr val="accent1"/>
+          </a:fillRef>
+          <a:effectRef idx="0">
+            <a:schemeClr val="accent1"/>
+          </a:effectRef>
+          <a:fontRef idx="minor">
+            <a:schemeClr val="tx1"/>
+          </a:fontRef>
+        </p:style>
+      </p:cxnSp>
+      <p:cxnSp>
+        <p:nvCxnSpPr>
+          <p:cNvPr id="15" name="Straight Arrow Connector 14">
+            <a:extLst>
+              <a:ext uri="{FF2B5EF4-FFF2-40B4-BE49-F238E27FC236}">
+                <a16:creationId xmlns:a16="http://schemas.microsoft.com/office/drawing/2014/main" id="{FE4D7E24-1857-46B2-A892-EED5C8F28489}"/>
+              </a:ext>
+            </a:extLst>
+          </p:cNvPr>
+          <p:cNvCxnSpPr>
+            <a:cxnSpLocks/>
+            <a:stCxn id="7" idx="3"/>
+            <a:endCxn id="13" idx="1"/>
+          </p:cNvCxnSpPr>
+          <p:nvPr/>
+        </p:nvCxnSpPr>
+        <p:spPr>
+          <a:xfrm>
+            <a:off x="6715123" y="2074545"/>
+            <a:ext cx="1183741" cy="563063"/>
+          </a:xfrm>
+          <a:prstGeom prst="straightConnector1">
+            <a:avLst/>
+          </a:prstGeom>
+          <a:ln w="28575">
+            <a:solidFill>
+              <a:srgbClr val="FF0000"/>
+            </a:solidFill>
+            <a:tailEnd type="triangle"/>
+          </a:ln>
+        </p:spPr>
+        <p:style>
+          <a:lnRef idx="1">
+            <a:schemeClr val="accent1"/>
+          </a:lnRef>
+          <a:fillRef idx="0">
+            <a:schemeClr val="accent1"/>
+          </a:fillRef>
+          <a:effectRef idx="0">
+            <a:schemeClr val="accent1"/>
+          </a:effectRef>
+          <a:fontRef idx="minor">
+            <a:schemeClr val="tx1"/>
+          </a:fontRef>
+        </p:style>
+      </p:cxnSp>
+      <p:sp>
+        <p:nvSpPr>
+          <p:cNvPr id="20" name="Oval 19">
+            <a:extLst>
+              <a:ext uri="{FF2B5EF4-FFF2-40B4-BE49-F238E27FC236}">
+                <a16:creationId xmlns:a16="http://schemas.microsoft.com/office/drawing/2014/main" id="{74E94F76-FCEC-4EF5-9F0D-C8F1753FB78C}"/>
+              </a:ext>
+            </a:extLst>
+          </p:cNvPr>
+          <p:cNvSpPr/>
+          <p:nvPr/>
+        </p:nvSpPr>
+        <p:spPr>
+          <a:xfrm>
+            <a:off x="1343180" y="1411312"/>
+            <a:ext cx="220470" cy="211750"/>
+          </a:xfrm>
+          <a:prstGeom prst="ellipse">
+            <a:avLst/>
+          </a:prstGeom>
+          <a:solidFill>
+            <a:schemeClr val="bg1"/>
+          </a:solidFill>
+          <a:ln w="12700">
+            <a:solidFill>
+              <a:schemeClr val="tx2"/>
+            </a:solidFill>
+          </a:ln>
+        </p:spPr>
+        <p:style>
+          <a:lnRef idx="2">
+            <a:schemeClr val="accent1">
+              <a:shade val="50000"/>
+            </a:schemeClr>
+          </a:lnRef>
+          <a:fillRef idx="1">
+            <a:schemeClr val="accent1"/>
+          </a:fillRef>
+          <a:effectRef idx="0">
+            <a:schemeClr val="accent1"/>
+          </a:effectRef>
+          <a:fontRef idx="minor">
+            <a:schemeClr val="lt1"/>
+          </a:fontRef>
+        </p:style>
+        <p:txBody>
+          <a:bodyPr rtlCol="0" anchor="ctr"/>
+          <a:lstStyle/>
+          <a:p>
+            <a:pPr algn="ctr"/>
+            <a:r>
+              <a:rPr lang="en-SG" sz="1600" dirty="0">
+                <a:solidFill>
+                  <a:schemeClr val="tx2"/>
+                </a:solidFill>
+              </a:rPr>
+              <a:t>1</a:t>
+            </a:r>
+          </a:p>
+        </p:txBody>
+      </p:sp>
+      <p:sp>
+        <p:nvSpPr>
+          <p:cNvPr id="21" name="Oval 20">
+            <a:extLst>
+              <a:ext uri="{FF2B5EF4-FFF2-40B4-BE49-F238E27FC236}">
+                <a16:creationId xmlns:a16="http://schemas.microsoft.com/office/drawing/2014/main" id="{B1B09842-E2B4-4F0F-A3F5-E36B623598FD}"/>
+              </a:ext>
+            </a:extLst>
+          </p:cNvPr>
+          <p:cNvSpPr/>
+          <p:nvPr/>
+        </p:nvSpPr>
+        <p:spPr>
+          <a:xfrm>
+            <a:off x="7678394" y="558206"/>
+            <a:ext cx="220470" cy="211750"/>
+          </a:xfrm>
+          <a:prstGeom prst="ellipse">
+            <a:avLst/>
+          </a:prstGeom>
+          <a:solidFill>
+            <a:schemeClr val="bg1"/>
+          </a:solidFill>
+          <a:ln w="12700">
+            <a:solidFill>
+              <a:schemeClr val="tx2"/>
+            </a:solidFill>
+          </a:ln>
+        </p:spPr>
+        <p:style>
+          <a:lnRef idx="2">
+            <a:schemeClr val="accent1">
+              <a:shade val="50000"/>
+            </a:schemeClr>
+          </a:lnRef>
+          <a:fillRef idx="1">
+            <a:schemeClr val="accent1"/>
+          </a:fillRef>
+          <a:effectRef idx="0">
+            <a:schemeClr val="accent1"/>
+          </a:effectRef>
+          <a:fontRef idx="minor">
+            <a:schemeClr val="lt1"/>
+          </a:fontRef>
+        </p:style>
+        <p:txBody>
+          <a:bodyPr rtlCol="0" anchor="ctr"/>
+          <a:lstStyle/>
+          <a:p>
+            <a:pPr algn="ctr"/>
+            <a:r>
+              <a:rPr lang="en-SG" sz="1600" dirty="0">
+                <a:solidFill>
+                  <a:schemeClr val="tx2"/>
+                </a:solidFill>
+              </a:rPr>
+              <a:t>2</a:t>
+            </a:r>
+          </a:p>
+        </p:txBody>
+      </p:sp>
+      <p:sp>
+        <p:nvSpPr>
+          <p:cNvPr id="22" name="Oval 21">
+            <a:extLst>
+              <a:ext uri="{FF2B5EF4-FFF2-40B4-BE49-F238E27FC236}">
+                <a16:creationId xmlns:a16="http://schemas.microsoft.com/office/drawing/2014/main" id="{FBBFA7F7-3154-4532-A68F-EFD20FCD970D}"/>
+              </a:ext>
+            </a:extLst>
+          </p:cNvPr>
+          <p:cNvSpPr/>
+          <p:nvPr/>
+        </p:nvSpPr>
+        <p:spPr>
+          <a:xfrm>
+            <a:off x="7661983" y="1968669"/>
+            <a:ext cx="220470" cy="211750"/>
+          </a:xfrm>
+          <a:prstGeom prst="ellipse">
+            <a:avLst/>
+          </a:prstGeom>
+          <a:solidFill>
+            <a:schemeClr val="bg1"/>
+          </a:solidFill>
+          <a:ln w="12700">
+            <a:solidFill>
+              <a:schemeClr val="tx2"/>
+            </a:solidFill>
+          </a:ln>
+        </p:spPr>
+        <p:style>
+          <a:lnRef idx="2">
+            <a:schemeClr val="accent1">
+              <a:shade val="50000"/>
+            </a:schemeClr>
+          </a:lnRef>
+          <a:fillRef idx="1">
+            <a:schemeClr val="accent1"/>
+          </a:fillRef>
+          <a:effectRef idx="0">
+            <a:schemeClr val="accent1"/>
+          </a:effectRef>
+          <a:fontRef idx="minor">
+            <a:schemeClr val="lt1"/>
+          </a:fontRef>
+        </p:style>
+        <p:txBody>
+          <a:bodyPr rtlCol="0" anchor="ctr"/>
+          <a:lstStyle/>
+          <a:p>
+            <a:pPr algn="ctr"/>
+            <a:r>
+              <a:rPr lang="en-SG" sz="1600" dirty="0">
+                <a:solidFill>
+                  <a:schemeClr val="tx2"/>
+                </a:solidFill>
+              </a:rPr>
+              <a:t>3</a:t>
+            </a:r>
+          </a:p>
+        </p:txBody>
+      </p:sp>
+      <p:sp>
+        <p:nvSpPr>
+          <p:cNvPr id="23" name="Oval 22">
+            <a:extLst>
+              <a:ext uri="{FF2B5EF4-FFF2-40B4-BE49-F238E27FC236}">
+                <a16:creationId xmlns:a16="http://schemas.microsoft.com/office/drawing/2014/main" id="{02D120E9-F7CE-422F-9C06-6CB9038651CE}"/>
+              </a:ext>
+            </a:extLst>
+          </p:cNvPr>
+          <p:cNvSpPr/>
+          <p:nvPr/>
+        </p:nvSpPr>
+        <p:spPr>
+          <a:xfrm>
+            <a:off x="6776081" y="2497958"/>
+            <a:ext cx="220470" cy="211750"/>
+          </a:xfrm>
+          <a:prstGeom prst="ellipse">
+            <a:avLst/>
+          </a:prstGeom>
+          <a:solidFill>
+            <a:schemeClr val="bg1"/>
+          </a:solidFill>
+          <a:ln w="12700">
+            <a:solidFill>
+              <a:schemeClr val="tx2"/>
+            </a:solidFill>
+          </a:ln>
+        </p:spPr>
+        <p:style>
+          <a:lnRef idx="2">
+            <a:schemeClr val="accent1">
+              <a:shade val="50000"/>
+            </a:schemeClr>
+          </a:lnRef>
+          <a:fillRef idx="1">
+            <a:schemeClr val="accent1"/>
+          </a:fillRef>
+          <a:effectRef idx="0">
+            <a:schemeClr val="accent1"/>
+          </a:effectRef>
+          <a:fontRef idx="minor">
+            <a:schemeClr val="lt1"/>
+          </a:fontRef>
+        </p:style>
+        <p:txBody>
+          <a:bodyPr rtlCol="0" anchor="ctr"/>
+          <a:lstStyle/>
+          <a:p>
+            <a:pPr algn="ctr"/>
+            <a:r>
+              <a:rPr lang="en-SG" sz="1600" dirty="0">
+                <a:solidFill>
+                  <a:schemeClr val="tx2"/>
+                </a:solidFill>
+              </a:rPr>
+              <a:t>4</a:t>
+            </a:r>
+          </a:p>
+        </p:txBody>
+      </p:sp>
+      <p:sp>
+        <p:nvSpPr>
+          <p:cNvPr id="24" name="Oval 23">
+            <a:extLst>
+              <a:ext uri="{FF2B5EF4-FFF2-40B4-BE49-F238E27FC236}">
+                <a16:creationId xmlns:a16="http://schemas.microsoft.com/office/drawing/2014/main" id="{BA852EF5-AB21-43D6-B333-0D1AC1631B4C}"/>
+              </a:ext>
+            </a:extLst>
+          </p:cNvPr>
+          <p:cNvSpPr/>
+          <p:nvPr/>
+        </p:nvSpPr>
+        <p:spPr>
+          <a:xfrm>
+            <a:off x="6776081" y="2993558"/>
+            <a:ext cx="220470" cy="211750"/>
+          </a:xfrm>
+          <a:prstGeom prst="ellipse">
+            <a:avLst/>
+          </a:prstGeom>
+          <a:solidFill>
+            <a:schemeClr val="bg1"/>
+          </a:solidFill>
+          <a:ln w="12700">
+            <a:solidFill>
+              <a:schemeClr val="tx2"/>
+            </a:solidFill>
+          </a:ln>
+        </p:spPr>
+        <p:style>
+          <a:lnRef idx="2">
+            <a:schemeClr val="accent1">
+              <a:shade val="50000"/>
+            </a:schemeClr>
+          </a:lnRef>
+          <a:fillRef idx="1">
+            <a:schemeClr val="accent1"/>
+          </a:fillRef>
+          <a:effectRef idx="0">
+            <a:schemeClr val="accent1"/>
+          </a:effectRef>
+          <a:fontRef idx="minor">
+            <a:schemeClr val="lt1"/>
+          </a:fontRef>
+        </p:style>
+        <p:txBody>
+          <a:bodyPr rtlCol="0" anchor="ctr"/>
+          <a:lstStyle/>
+          <a:p>
+            <a:pPr algn="ctr"/>
+            <a:r>
+              <a:rPr lang="en-SG" sz="1600" dirty="0">
+                <a:solidFill>
+                  <a:schemeClr val="tx2"/>
+                </a:solidFill>
+              </a:rPr>
+              <a:t>5</a:t>
+            </a:r>
+          </a:p>
+        </p:txBody>
+      </p:sp>
     </p:spTree>
     <p:extLst>
       <p:ext uri="{BB962C8B-B14F-4D97-AF65-F5344CB8AC3E}">
-        <p14:creationId xmlns:p14="http://schemas.microsoft.com/office/powerpoint/2010/main" val="1280134521"/>
+        <p14:creationId xmlns:p14="http://schemas.microsoft.com/office/powerpoint/2010/main" val="2763304473"/>
+      </p:ext>
+    </p:extLst>
+  </p:cSld>
+  <p:clrMapOvr>
+    <a:masterClrMapping/>
+  </p:clrMapOvr>
+</p:sld>
+</file>
+
+<file path=ppt/slides/slide3.xml><?xml version="1.0" encoding="utf-8"?>
+<p:sld xmlns:a="http://schemas.openxmlformats.org/drawingml/2006/main" xmlns:r="http://schemas.openxmlformats.org/officeDocument/2006/relationships" xmlns:p="http://schemas.openxmlformats.org/presentationml/2006/main">
+  <p:cSld>
+    <p:spTree>
+      <p:nvGrpSpPr>
+        <p:cNvPr id="1" name=""/>
+        <p:cNvGrpSpPr/>
+        <p:nvPr/>
+      </p:nvGrpSpPr>
+      <p:grpSpPr>
+        <a:xfrm>
+          <a:off x="0" y="0"/>
+          <a:ext cx="0" cy="0"/>
+          <a:chOff x="0" y="0"/>
+          <a:chExt cx="0" cy="0"/>
+        </a:xfrm>
+      </p:grpSpPr>
+      <p:grpSp>
+        <p:nvGrpSpPr>
+          <p:cNvPr id="50" name="Group 49">
+            <a:extLst>
+              <a:ext uri="{FF2B5EF4-FFF2-40B4-BE49-F238E27FC236}">
+                <a16:creationId xmlns:a16="http://schemas.microsoft.com/office/drawing/2014/main" id="{823AE8A7-67D2-4E4E-B9E7-E77DCE7C1D71}"/>
+              </a:ext>
+            </a:extLst>
+          </p:cNvPr>
+          <p:cNvGrpSpPr/>
+          <p:nvPr/>
+        </p:nvGrpSpPr>
+        <p:grpSpPr>
+          <a:xfrm>
+            <a:off x="561483" y="576937"/>
+            <a:ext cx="10247042" cy="5518791"/>
+            <a:chOff x="267868" y="157487"/>
+            <a:chExt cx="10247042" cy="5518791"/>
+          </a:xfrm>
+        </p:grpSpPr>
+        <p:pic>
+          <p:nvPicPr>
+            <p:cNvPr id="5" name="Picture 4" descr="Map&#10;&#10;Description automatically generated">
+              <a:extLst>
+                <a:ext uri="{FF2B5EF4-FFF2-40B4-BE49-F238E27FC236}">
+                  <a16:creationId xmlns:a16="http://schemas.microsoft.com/office/drawing/2014/main" id="{82508C7F-E388-46A0-BC54-4AC66AE3DB51}"/>
+                </a:ext>
+              </a:extLst>
+            </p:cNvPr>
+            <p:cNvPicPr>
+              <a:picLocks noChangeAspect="1"/>
+            </p:cNvPicPr>
+            <p:nvPr/>
+          </p:nvPicPr>
+          <p:blipFill>
+            <a:blip r:embed="rId2">
+              <a:extLst>
+                <a:ext uri="{28A0092B-C50C-407E-A947-70E740481C1C}">
+                  <a14:useLocalDpi xmlns:a14="http://schemas.microsoft.com/office/drawing/2010/main" val="0"/>
+                </a:ext>
+              </a:extLst>
+            </a:blip>
+            <a:stretch>
+              <a:fillRect/>
+            </a:stretch>
+          </p:blipFill>
+          <p:spPr>
+            <a:xfrm>
+              <a:off x="2068976" y="1568354"/>
+              <a:ext cx="8445934" cy="3721291"/>
+            </a:xfrm>
+            <a:prstGeom prst="rect">
+              <a:avLst/>
+            </a:prstGeom>
+          </p:spPr>
+        </p:pic>
+        <p:sp>
+          <p:nvSpPr>
+            <p:cNvPr id="6" name="Rectangle 5">
+              <a:extLst>
+                <a:ext uri="{FF2B5EF4-FFF2-40B4-BE49-F238E27FC236}">
+                  <a16:creationId xmlns:a16="http://schemas.microsoft.com/office/drawing/2014/main" id="{BEDE08CD-4A61-4A36-BE93-C03BDDDCC840}"/>
+                </a:ext>
+              </a:extLst>
+            </p:cNvPr>
+            <p:cNvSpPr/>
+            <p:nvPr/>
+          </p:nvSpPr>
+          <p:spPr>
+            <a:xfrm>
+              <a:off x="2068976" y="2118048"/>
+              <a:ext cx="1392681" cy="270589"/>
+            </a:xfrm>
+            <a:prstGeom prst="rect">
+              <a:avLst/>
+            </a:prstGeom>
+            <a:noFill/>
+            <a:ln w="38100">
+              <a:solidFill>
+                <a:srgbClr val="FF0000"/>
+              </a:solidFill>
+            </a:ln>
+          </p:spPr>
+          <p:style>
+            <a:lnRef idx="2">
+              <a:schemeClr val="accent1">
+                <a:shade val="50000"/>
+              </a:schemeClr>
+            </a:lnRef>
+            <a:fillRef idx="1">
+              <a:schemeClr val="accent1"/>
+            </a:fillRef>
+            <a:effectRef idx="0">
+              <a:schemeClr val="accent1"/>
+            </a:effectRef>
+            <a:fontRef idx="minor">
+              <a:schemeClr val="lt1"/>
+            </a:fontRef>
+          </p:style>
+          <p:txBody>
+            <a:bodyPr rtlCol="0" anchor="ctr"/>
+            <a:lstStyle/>
+            <a:p>
+              <a:pPr algn="ctr"/>
+              <a:endParaRPr lang="en-SG" dirty="0"/>
+            </a:p>
+          </p:txBody>
+        </p:sp>
+        <p:sp>
+          <p:nvSpPr>
+            <p:cNvPr id="7" name="Rectangle 6">
+              <a:extLst>
+                <a:ext uri="{FF2B5EF4-FFF2-40B4-BE49-F238E27FC236}">
+                  <a16:creationId xmlns:a16="http://schemas.microsoft.com/office/drawing/2014/main" id="{BE7D20C4-E4D1-42FE-9D0F-7C292B9CBCFE}"/>
+                </a:ext>
+              </a:extLst>
+            </p:cNvPr>
+            <p:cNvSpPr/>
+            <p:nvPr/>
+          </p:nvSpPr>
+          <p:spPr>
+            <a:xfrm>
+              <a:off x="3648961" y="1729273"/>
+              <a:ext cx="1081660" cy="482082"/>
+            </a:xfrm>
+            <a:prstGeom prst="rect">
+              <a:avLst/>
+            </a:prstGeom>
+            <a:noFill/>
+            <a:ln w="38100">
+              <a:solidFill>
+                <a:srgbClr val="FF0000"/>
+              </a:solidFill>
+            </a:ln>
+          </p:spPr>
+          <p:style>
+            <a:lnRef idx="2">
+              <a:schemeClr val="accent1">
+                <a:shade val="50000"/>
+              </a:schemeClr>
+            </a:lnRef>
+            <a:fillRef idx="1">
+              <a:schemeClr val="accent1"/>
+            </a:fillRef>
+            <a:effectRef idx="0">
+              <a:schemeClr val="accent1"/>
+            </a:effectRef>
+            <a:fontRef idx="minor">
+              <a:schemeClr val="lt1"/>
+            </a:fontRef>
+          </p:style>
+          <p:txBody>
+            <a:bodyPr rtlCol="0" anchor="ctr"/>
+            <a:lstStyle/>
+            <a:p>
+              <a:pPr algn="ctr"/>
+              <a:endParaRPr lang="en-SG" dirty="0"/>
+            </a:p>
+          </p:txBody>
+        </p:sp>
+        <p:sp>
+          <p:nvSpPr>
+            <p:cNvPr id="8" name="Rectangle 7">
+              <a:extLst>
+                <a:ext uri="{FF2B5EF4-FFF2-40B4-BE49-F238E27FC236}">
+                  <a16:creationId xmlns:a16="http://schemas.microsoft.com/office/drawing/2014/main" id="{101139D4-3094-481C-BEA8-D695A7C91A67}"/>
+                </a:ext>
+              </a:extLst>
+            </p:cNvPr>
+            <p:cNvSpPr/>
+            <p:nvPr/>
+          </p:nvSpPr>
+          <p:spPr>
+            <a:xfrm>
+              <a:off x="3648961" y="2233125"/>
+              <a:ext cx="1081660" cy="528735"/>
+            </a:xfrm>
+            <a:prstGeom prst="rect">
+              <a:avLst/>
+            </a:prstGeom>
+            <a:noFill/>
+            <a:ln w="38100">
+              <a:solidFill>
+                <a:srgbClr val="FF0000"/>
+              </a:solidFill>
+            </a:ln>
+          </p:spPr>
+          <p:style>
+            <a:lnRef idx="2">
+              <a:schemeClr val="accent1">
+                <a:shade val="50000"/>
+              </a:schemeClr>
+            </a:lnRef>
+            <a:fillRef idx="1">
+              <a:schemeClr val="accent1"/>
+            </a:fillRef>
+            <a:effectRef idx="0">
+              <a:schemeClr val="accent1"/>
+            </a:effectRef>
+            <a:fontRef idx="minor">
+              <a:schemeClr val="lt1"/>
+            </a:fontRef>
+          </p:style>
+          <p:txBody>
+            <a:bodyPr rtlCol="0" anchor="ctr"/>
+            <a:lstStyle/>
+            <a:p>
+              <a:pPr algn="ctr"/>
+              <a:endParaRPr lang="en-SG" dirty="0"/>
+            </a:p>
+          </p:txBody>
+        </p:sp>
+        <p:cxnSp>
+          <p:nvCxnSpPr>
+            <p:cNvPr id="10" name="Straight Arrow Connector 9">
+              <a:extLst>
+                <a:ext uri="{FF2B5EF4-FFF2-40B4-BE49-F238E27FC236}">
+                  <a16:creationId xmlns:a16="http://schemas.microsoft.com/office/drawing/2014/main" id="{3A1B541D-7E20-423C-B5E6-9E3AF1CC3783}"/>
+                </a:ext>
+              </a:extLst>
+            </p:cNvPr>
+            <p:cNvCxnSpPr>
+              <a:cxnSpLocks/>
+              <a:stCxn id="7" idx="1"/>
+              <a:endCxn id="18" idx="3"/>
+            </p:cNvCxnSpPr>
+            <p:nvPr/>
+          </p:nvCxnSpPr>
+          <p:spPr>
+            <a:xfrm flipH="1" flipV="1">
+              <a:off x="1975324" y="1568354"/>
+              <a:ext cx="1673637" cy="401960"/>
+            </a:xfrm>
+            <a:prstGeom prst="straightConnector1">
+              <a:avLst/>
+            </a:prstGeom>
+            <a:ln w="28575">
+              <a:solidFill>
+                <a:srgbClr val="FF0000"/>
+              </a:solidFill>
+              <a:tailEnd type="triangle"/>
+            </a:ln>
+          </p:spPr>
+          <p:style>
+            <a:lnRef idx="1">
+              <a:schemeClr val="accent1"/>
+            </a:lnRef>
+            <a:fillRef idx="0">
+              <a:schemeClr val="accent1"/>
+            </a:fillRef>
+            <a:effectRef idx="0">
+              <a:schemeClr val="accent1"/>
+            </a:effectRef>
+            <a:fontRef idx="minor">
+              <a:schemeClr val="tx1"/>
+            </a:fontRef>
+          </p:style>
+        </p:cxnSp>
+        <p:cxnSp>
+          <p:nvCxnSpPr>
+            <p:cNvPr id="13" name="Straight Arrow Connector 12">
+              <a:extLst>
+                <a:ext uri="{FF2B5EF4-FFF2-40B4-BE49-F238E27FC236}">
+                  <a16:creationId xmlns:a16="http://schemas.microsoft.com/office/drawing/2014/main" id="{5F70049B-14E2-47A2-A844-0A803EBFB8A5}"/>
+                </a:ext>
+              </a:extLst>
+            </p:cNvPr>
+            <p:cNvCxnSpPr>
+              <a:cxnSpLocks/>
+              <a:stCxn id="8" idx="1"/>
+              <a:endCxn id="21" idx="3"/>
+            </p:cNvCxnSpPr>
+            <p:nvPr/>
+          </p:nvCxnSpPr>
+          <p:spPr>
+            <a:xfrm flipH="1">
+              <a:off x="1975324" y="2497493"/>
+              <a:ext cx="1673637" cy="1867443"/>
+            </a:xfrm>
+            <a:prstGeom prst="straightConnector1">
+              <a:avLst/>
+            </a:prstGeom>
+            <a:ln w="28575">
+              <a:solidFill>
+                <a:srgbClr val="FF0000"/>
+              </a:solidFill>
+              <a:tailEnd type="triangle"/>
+            </a:ln>
+          </p:spPr>
+          <p:style>
+            <a:lnRef idx="1">
+              <a:schemeClr val="accent1"/>
+            </a:lnRef>
+            <a:fillRef idx="0">
+              <a:schemeClr val="accent1"/>
+            </a:fillRef>
+            <a:effectRef idx="0">
+              <a:schemeClr val="accent1"/>
+            </a:effectRef>
+            <a:fontRef idx="minor">
+              <a:schemeClr val="tx1"/>
+            </a:fontRef>
+          </p:style>
+        </p:cxnSp>
+        <p:pic>
+          <p:nvPicPr>
+            <p:cNvPr id="18" name="Picture 17" descr="Graphical user interface, text, application&#10;&#10;Description automatically generated">
+              <a:extLst>
+                <a:ext uri="{FF2B5EF4-FFF2-40B4-BE49-F238E27FC236}">
+                  <a16:creationId xmlns:a16="http://schemas.microsoft.com/office/drawing/2014/main" id="{A9470C70-53A0-4287-80E8-EB53B1136CA1}"/>
+                </a:ext>
+              </a:extLst>
+            </p:cNvPr>
+            <p:cNvPicPr>
+              <a:picLocks noChangeAspect="1"/>
+            </p:cNvPicPr>
+            <p:nvPr/>
+          </p:nvPicPr>
+          <p:blipFill>
+            <a:blip r:embed="rId3">
+              <a:extLst>
+                <a:ext uri="{28A0092B-C50C-407E-A947-70E740481C1C}">
+                  <a14:useLocalDpi xmlns:a14="http://schemas.microsoft.com/office/drawing/2010/main" val="0"/>
+                </a:ext>
+              </a:extLst>
+            </a:blip>
+            <a:stretch>
+              <a:fillRect/>
+            </a:stretch>
+          </p:blipFill>
+          <p:spPr>
+            <a:xfrm>
+              <a:off x="419494" y="263362"/>
+              <a:ext cx="1555830" cy="2609984"/>
+            </a:xfrm>
+            <a:prstGeom prst="rect">
+              <a:avLst/>
+            </a:prstGeom>
+          </p:spPr>
+        </p:pic>
+        <p:pic>
+          <p:nvPicPr>
+            <p:cNvPr id="21" name="Picture 20" descr="Graphical user interface, text, application&#10;&#10;Description automatically generated">
+              <a:extLst>
+                <a:ext uri="{FF2B5EF4-FFF2-40B4-BE49-F238E27FC236}">
+                  <a16:creationId xmlns:a16="http://schemas.microsoft.com/office/drawing/2014/main" id="{C94D4090-4A1C-4315-B7AC-251F953A4DA6}"/>
+                </a:ext>
+              </a:extLst>
+            </p:cNvPr>
+            <p:cNvPicPr>
+              <a:picLocks noChangeAspect="1"/>
+            </p:cNvPicPr>
+            <p:nvPr/>
+          </p:nvPicPr>
+          <p:blipFill>
+            <a:blip r:embed="rId4">
+              <a:extLst>
+                <a:ext uri="{28A0092B-C50C-407E-A947-70E740481C1C}">
+                  <a14:useLocalDpi xmlns:a14="http://schemas.microsoft.com/office/drawing/2010/main" val="0"/>
+                </a:ext>
+              </a:extLst>
+            </a:blip>
+            <a:stretch>
+              <a:fillRect/>
+            </a:stretch>
+          </p:blipFill>
+          <p:spPr>
+            <a:xfrm>
+              <a:off x="432195" y="3053593"/>
+              <a:ext cx="1543129" cy="2622685"/>
+            </a:xfrm>
+            <a:prstGeom prst="rect">
+              <a:avLst/>
+            </a:prstGeom>
+          </p:spPr>
+        </p:pic>
+        <p:sp>
+          <p:nvSpPr>
+            <p:cNvPr id="36" name="Rectangle 35">
+              <a:extLst>
+                <a:ext uri="{FF2B5EF4-FFF2-40B4-BE49-F238E27FC236}">
+                  <a16:creationId xmlns:a16="http://schemas.microsoft.com/office/drawing/2014/main" id="{97166686-172A-47E2-85ED-B90E4C57E697}"/>
+                </a:ext>
+              </a:extLst>
+            </p:cNvPr>
+            <p:cNvSpPr/>
+            <p:nvPr/>
+          </p:nvSpPr>
+          <p:spPr>
+            <a:xfrm>
+              <a:off x="6096000" y="2490756"/>
+              <a:ext cx="1081660" cy="688672"/>
+            </a:xfrm>
+            <a:prstGeom prst="rect">
+              <a:avLst/>
+            </a:prstGeom>
+            <a:noFill/>
+            <a:ln w="38100">
+              <a:solidFill>
+                <a:srgbClr val="FF0000"/>
+              </a:solidFill>
+            </a:ln>
+          </p:spPr>
+          <p:style>
+            <a:lnRef idx="2">
+              <a:schemeClr val="accent1">
+                <a:shade val="50000"/>
+              </a:schemeClr>
+            </a:lnRef>
+            <a:fillRef idx="1">
+              <a:schemeClr val="accent1"/>
+            </a:fillRef>
+            <a:effectRef idx="0">
+              <a:schemeClr val="accent1"/>
+            </a:effectRef>
+            <a:fontRef idx="minor">
+              <a:schemeClr val="lt1"/>
+            </a:fontRef>
+          </p:style>
+          <p:txBody>
+            <a:bodyPr rtlCol="0" anchor="ctr"/>
+            <a:lstStyle/>
+            <a:p>
+              <a:pPr algn="ctr"/>
+              <a:endParaRPr lang="en-SG" dirty="0"/>
+            </a:p>
+          </p:txBody>
+        </p:sp>
+        <p:sp>
+          <p:nvSpPr>
+            <p:cNvPr id="37" name="Rectangle 36">
+              <a:extLst>
+                <a:ext uri="{FF2B5EF4-FFF2-40B4-BE49-F238E27FC236}">
+                  <a16:creationId xmlns:a16="http://schemas.microsoft.com/office/drawing/2014/main" id="{77FC9050-2069-4AF5-BFE0-CF1340EA2C9A}"/>
+                </a:ext>
+              </a:extLst>
+            </p:cNvPr>
+            <p:cNvSpPr/>
+            <p:nvPr/>
+          </p:nvSpPr>
+          <p:spPr>
+            <a:xfrm>
+              <a:off x="8630874" y="2253342"/>
+              <a:ext cx="1679196" cy="926086"/>
+            </a:xfrm>
+            <a:prstGeom prst="rect">
+              <a:avLst/>
+            </a:prstGeom>
+            <a:noFill/>
+            <a:ln w="38100">
+              <a:solidFill>
+                <a:srgbClr val="FF0000"/>
+              </a:solidFill>
+            </a:ln>
+          </p:spPr>
+          <p:style>
+            <a:lnRef idx="2">
+              <a:schemeClr val="accent1">
+                <a:shade val="50000"/>
+              </a:schemeClr>
+            </a:lnRef>
+            <a:fillRef idx="1">
+              <a:schemeClr val="accent1"/>
+            </a:fillRef>
+            <a:effectRef idx="0">
+              <a:schemeClr val="accent1"/>
+            </a:effectRef>
+            <a:fontRef idx="minor">
+              <a:schemeClr val="lt1"/>
+            </a:fontRef>
+          </p:style>
+          <p:txBody>
+            <a:bodyPr rtlCol="0" anchor="ctr"/>
+            <a:lstStyle/>
+            <a:p>
+              <a:pPr algn="ctr"/>
+              <a:endParaRPr lang="en-SG" dirty="0"/>
+            </a:p>
+          </p:txBody>
+        </p:sp>
+        <p:cxnSp>
+          <p:nvCxnSpPr>
+            <p:cNvPr id="38" name="Straight Arrow Connector 37">
+              <a:extLst>
+                <a:ext uri="{FF2B5EF4-FFF2-40B4-BE49-F238E27FC236}">
+                  <a16:creationId xmlns:a16="http://schemas.microsoft.com/office/drawing/2014/main" id="{D496BA38-05F8-4BC7-B57A-BF3AA9B9B50A}"/>
+                </a:ext>
+              </a:extLst>
+            </p:cNvPr>
+            <p:cNvCxnSpPr>
+              <a:cxnSpLocks/>
+              <a:stCxn id="36" idx="0"/>
+            </p:cNvCxnSpPr>
+            <p:nvPr/>
+          </p:nvCxnSpPr>
+          <p:spPr>
+            <a:xfrm flipV="1">
+              <a:off x="6636830" y="1107153"/>
+              <a:ext cx="1030389" cy="1383603"/>
+            </a:xfrm>
+            <a:prstGeom prst="straightConnector1">
+              <a:avLst/>
+            </a:prstGeom>
+            <a:ln w="28575">
+              <a:solidFill>
+                <a:srgbClr val="FF0000"/>
+              </a:solidFill>
+              <a:tailEnd type="triangle"/>
+            </a:ln>
+          </p:spPr>
+          <p:style>
+            <a:lnRef idx="1">
+              <a:schemeClr val="accent1"/>
+            </a:lnRef>
+            <a:fillRef idx="0">
+              <a:schemeClr val="accent1"/>
+            </a:fillRef>
+            <a:effectRef idx="0">
+              <a:schemeClr val="accent1"/>
+            </a:effectRef>
+            <a:fontRef idx="minor">
+              <a:schemeClr val="tx1"/>
+            </a:fontRef>
+          </p:style>
+        </p:cxnSp>
+        <p:cxnSp>
+          <p:nvCxnSpPr>
+            <p:cNvPr id="41" name="Straight Arrow Connector 40">
+              <a:extLst>
+                <a:ext uri="{FF2B5EF4-FFF2-40B4-BE49-F238E27FC236}">
+                  <a16:creationId xmlns:a16="http://schemas.microsoft.com/office/drawing/2014/main" id="{E003317E-94AC-45E1-8BC6-87E614DA1D06}"/>
+                </a:ext>
+              </a:extLst>
+            </p:cNvPr>
+            <p:cNvCxnSpPr>
+              <a:cxnSpLocks/>
+              <a:stCxn id="37" idx="0"/>
+            </p:cNvCxnSpPr>
+            <p:nvPr/>
+          </p:nvCxnSpPr>
+          <p:spPr>
+            <a:xfrm flipH="1" flipV="1">
+              <a:off x="8216815" y="1107153"/>
+              <a:ext cx="1253657" cy="1146189"/>
+            </a:xfrm>
+            <a:prstGeom prst="straightConnector1">
+              <a:avLst/>
+            </a:prstGeom>
+            <a:ln w="28575">
+              <a:solidFill>
+                <a:srgbClr val="FF0000"/>
+              </a:solidFill>
+              <a:tailEnd type="triangle"/>
+            </a:ln>
+          </p:spPr>
+          <p:style>
+            <a:lnRef idx="1">
+              <a:schemeClr val="accent1"/>
+            </a:lnRef>
+            <a:fillRef idx="0">
+              <a:schemeClr val="accent1"/>
+            </a:fillRef>
+            <a:effectRef idx="0">
+              <a:schemeClr val="accent1"/>
+            </a:effectRef>
+            <a:fontRef idx="minor">
+              <a:schemeClr val="tx1"/>
+            </a:fontRef>
+          </p:style>
+        </p:cxnSp>
+        <p:sp>
+          <p:nvSpPr>
+            <p:cNvPr id="44" name="TextBox 43">
+              <a:extLst>
+                <a:ext uri="{FF2B5EF4-FFF2-40B4-BE49-F238E27FC236}">
+                  <a16:creationId xmlns:a16="http://schemas.microsoft.com/office/drawing/2014/main" id="{7FDD14EC-45D7-4522-B0A7-634E7D200970}"/>
+                </a:ext>
+              </a:extLst>
+            </p:cNvPr>
+            <p:cNvSpPr txBox="1"/>
+            <p:nvPr/>
+          </p:nvSpPr>
+          <p:spPr>
+            <a:xfrm>
+              <a:off x="6478488" y="522378"/>
+              <a:ext cx="2927059" cy="584775"/>
+            </a:xfrm>
+            <a:prstGeom prst="rect">
+              <a:avLst/>
+            </a:prstGeom>
+            <a:noFill/>
+            <a:ln>
+              <a:solidFill>
+                <a:schemeClr val="tx2"/>
+              </a:solidFill>
+            </a:ln>
+          </p:spPr>
+          <p:txBody>
+            <a:bodyPr wrap="square" rtlCol="0">
+              <a:spAutoFit/>
+            </a:bodyPr>
+            <a:lstStyle/>
+            <a:p>
+              <a:pPr algn="ctr"/>
+              <a:r>
+                <a:rPr lang="en-SG" sz="1600" dirty="0">
+                  <a:solidFill>
+                    <a:schemeClr val="tx2"/>
+                  </a:solidFill>
+                </a:rPr>
+                <a:t>Additional information pop-up on selection of spatial boundary</a:t>
+              </a:r>
+            </a:p>
+          </p:txBody>
+        </p:sp>
+        <p:sp>
+          <p:nvSpPr>
+            <p:cNvPr id="47" name="Oval 46">
+              <a:extLst>
+                <a:ext uri="{FF2B5EF4-FFF2-40B4-BE49-F238E27FC236}">
+                  <a16:creationId xmlns:a16="http://schemas.microsoft.com/office/drawing/2014/main" id="{576D5D38-99EA-45BE-B017-37671EB41ECD}"/>
+                </a:ext>
+              </a:extLst>
+            </p:cNvPr>
+            <p:cNvSpPr/>
+            <p:nvPr/>
+          </p:nvSpPr>
+          <p:spPr>
+            <a:xfrm>
+              <a:off x="3208068" y="2153586"/>
+              <a:ext cx="220470" cy="211750"/>
+            </a:xfrm>
+            <a:prstGeom prst="ellipse">
+              <a:avLst/>
+            </a:prstGeom>
+            <a:solidFill>
+              <a:schemeClr val="bg1"/>
+            </a:solidFill>
+            <a:ln w="12700">
+              <a:solidFill>
+                <a:schemeClr val="bg2"/>
+              </a:solidFill>
+            </a:ln>
+          </p:spPr>
+          <p:style>
+            <a:lnRef idx="2">
+              <a:schemeClr val="accent1">
+                <a:shade val="50000"/>
+              </a:schemeClr>
+            </a:lnRef>
+            <a:fillRef idx="1">
+              <a:schemeClr val="accent1"/>
+            </a:fillRef>
+            <a:effectRef idx="0">
+              <a:schemeClr val="accent1"/>
+            </a:effectRef>
+            <a:fontRef idx="minor">
+              <a:schemeClr val="lt1"/>
+            </a:fontRef>
+          </p:style>
+          <p:txBody>
+            <a:bodyPr rtlCol="0" anchor="ctr"/>
+            <a:lstStyle/>
+            <a:p>
+              <a:pPr algn="ctr"/>
+              <a:r>
+                <a:rPr lang="en-SG" sz="1600" dirty="0">
+                  <a:solidFill>
+                    <a:schemeClr val="tx1">
+                      <a:lumMod val="65000"/>
+                      <a:lumOff val="35000"/>
+                    </a:schemeClr>
+                  </a:solidFill>
+                </a:rPr>
+                <a:t>1</a:t>
+              </a:r>
+            </a:p>
+          </p:txBody>
+        </p:sp>
+        <p:sp>
+          <p:nvSpPr>
+            <p:cNvPr id="48" name="Oval 47">
+              <a:extLst>
+                <a:ext uri="{FF2B5EF4-FFF2-40B4-BE49-F238E27FC236}">
+                  <a16:creationId xmlns:a16="http://schemas.microsoft.com/office/drawing/2014/main" id="{D3A5CD12-F90C-453A-A472-AF5214F91FB0}"/>
+                </a:ext>
+              </a:extLst>
+            </p:cNvPr>
+            <p:cNvSpPr/>
+            <p:nvPr/>
+          </p:nvSpPr>
+          <p:spPr>
+            <a:xfrm>
+              <a:off x="309259" y="157487"/>
+              <a:ext cx="220470" cy="211750"/>
+            </a:xfrm>
+            <a:prstGeom prst="ellipse">
+              <a:avLst/>
+            </a:prstGeom>
+            <a:solidFill>
+              <a:schemeClr val="bg1"/>
+            </a:solidFill>
+            <a:ln w="12700">
+              <a:solidFill>
+                <a:schemeClr val="tx2"/>
+              </a:solidFill>
+            </a:ln>
+          </p:spPr>
+          <p:style>
+            <a:lnRef idx="2">
+              <a:schemeClr val="accent1">
+                <a:shade val="50000"/>
+              </a:schemeClr>
+            </a:lnRef>
+            <a:fillRef idx="1">
+              <a:schemeClr val="accent1"/>
+            </a:fillRef>
+            <a:effectRef idx="0">
+              <a:schemeClr val="accent1"/>
+            </a:effectRef>
+            <a:fontRef idx="minor">
+              <a:schemeClr val="lt1"/>
+            </a:fontRef>
+          </p:style>
+          <p:txBody>
+            <a:bodyPr rtlCol="0" anchor="ctr"/>
+            <a:lstStyle/>
+            <a:p>
+              <a:pPr algn="ctr"/>
+              <a:r>
+                <a:rPr lang="en-SG" sz="1600" dirty="0">
+                  <a:solidFill>
+                    <a:schemeClr val="tx2"/>
+                  </a:solidFill>
+                </a:rPr>
+                <a:t>2</a:t>
+              </a:r>
+            </a:p>
+          </p:txBody>
+        </p:sp>
+        <p:sp>
+          <p:nvSpPr>
+            <p:cNvPr id="49" name="Oval 48">
+              <a:extLst>
+                <a:ext uri="{FF2B5EF4-FFF2-40B4-BE49-F238E27FC236}">
+                  <a16:creationId xmlns:a16="http://schemas.microsoft.com/office/drawing/2014/main" id="{09E36A79-E019-46A3-9F80-B0708B591BCB}"/>
+                </a:ext>
+              </a:extLst>
+            </p:cNvPr>
+            <p:cNvSpPr/>
+            <p:nvPr/>
+          </p:nvSpPr>
+          <p:spPr>
+            <a:xfrm>
+              <a:off x="267868" y="2958902"/>
+              <a:ext cx="220470" cy="211750"/>
+            </a:xfrm>
+            <a:prstGeom prst="ellipse">
+              <a:avLst/>
+            </a:prstGeom>
+            <a:solidFill>
+              <a:schemeClr val="bg1"/>
+            </a:solidFill>
+            <a:ln w="12700">
+              <a:solidFill>
+                <a:schemeClr val="tx2"/>
+              </a:solidFill>
+            </a:ln>
+          </p:spPr>
+          <p:style>
+            <a:lnRef idx="2">
+              <a:schemeClr val="accent1">
+                <a:shade val="50000"/>
+              </a:schemeClr>
+            </a:lnRef>
+            <a:fillRef idx="1">
+              <a:schemeClr val="accent1"/>
+            </a:fillRef>
+            <a:effectRef idx="0">
+              <a:schemeClr val="accent1"/>
+            </a:effectRef>
+            <a:fontRef idx="minor">
+              <a:schemeClr val="lt1"/>
+            </a:fontRef>
+          </p:style>
+          <p:txBody>
+            <a:bodyPr rtlCol="0" anchor="ctr"/>
+            <a:lstStyle/>
+            <a:p>
+              <a:pPr algn="ctr"/>
+              <a:r>
+                <a:rPr lang="en-SG" sz="1600" dirty="0">
+                  <a:solidFill>
+                    <a:schemeClr val="tx2"/>
+                  </a:solidFill>
+                </a:rPr>
+                <a:t>3</a:t>
+              </a:r>
+            </a:p>
+          </p:txBody>
+        </p:sp>
+      </p:grpSp>
+    </p:spTree>
+    <p:extLst>
+      <p:ext uri="{BB962C8B-B14F-4D97-AF65-F5344CB8AC3E}">
+        <p14:creationId xmlns:p14="http://schemas.microsoft.com/office/powerpoint/2010/main" val="1206743629"/>
+      </p:ext>
+    </p:extLst>
+  </p:cSld>
+  <p:clrMapOvr>
+    <a:masterClrMapping/>
+  </p:clrMapOvr>
+</p:sld>
+</file>
+
+<file path=ppt/slides/slide4.xml><?xml version="1.0" encoding="utf-8"?>
+<p:sld xmlns:a="http://schemas.openxmlformats.org/drawingml/2006/main" xmlns:r="http://schemas.openxmlformats.org/officeDocument/2006/relationships" xmlns:p="http://schemas.openxmlformats.org/presentationml/2006/main">
+  <p:cSld>
+    <p:spTree>
+      <p:nvGrpSpPr>
+        <p:cNvPr id="1" name=""/>
+        <p:cNvGrpSpPr/>
+        <p:nvPr/>
+      </p:nvGrpSpPr>
+      <p:grpSpPr>
+        <a:xfrm>
+          <a:off x="0" y="0"/>
+          <a:ext cx="0" cy="0"/>
+          <a:chOff x="0" y="0"/>
+          <a:chExt cx="0" cy="0"/>
+        </a:xfrm>
+      </p:grpSpPr>
+      <p:grpSp>
+        <p:nvGrpSpPr>
+          <p:cNvPr id="90" name="Group 89">
+            <a:extLst>
+              <a:ext uri="{FF2B5EF4-FFF2-40B4-BE49-F238E27FC236}">
+                <a16:creationId xmlns:a16="http://schemas.microsoft.com/office/drawing/2014/main" id="{F02883D2-40B9-43E7-9933-68E8F138AD8F}"/>
+              </a:ext>
+            </a:extLst>
+          </p:cNvPr>
+          <p:cNvGrpSpPr/>
+          <p:nvPr/>
+        </p:nvGrpSpPr>
+        <p:grpSpPr>
+          <a:xfrm>
+            <a:off x="548098" y="362388"/>
+            <a:ext cx="11095803" cy="5837381"/>
+            <a:chOff x="881385" y="421111"/>
+            <a:chExt cx="11095803" cy="5837381"/>
+          </a:xfrm>
+        </p:grpSpPr>
+        <p:pic>
+          <p:nvPicPr>
+            <p:cNvPr id="5" name="Picture 4" descr="Graphical user interface, application, map&#10;&#10;Description automatically generated">
+              <a:extLst>
+                <a:ext uri="{FF2B5EF4-FFF2-40B4-BE49-F238E27FC236}">
+                  <a16:creationId xmlns:a16="http://schemas.microsoft.com/office/drawing/2014/main" id="{BC5C3351-F19D-4B6F-861A-511A7EF63E33}"/>
+                </a:ext>
+              </a:extLst>
+            </p:cNvPr>
+            <p:cNvPicPr>
+              <a:picLocks noChangeAspect="1"/>
+            </p:cNvPicPr>
+            <p:nvPr/>
+          </p:nvPicPr>
+          <p:blipFill rotWithShape="1">
+            <a:blip r:embed="rId2">
+              <a:extLst>
+                <a:ext uri="{28A0092B-C50C-407E-A947-70E740481C1C}">
+                  <a14:useLocalDpi xmlns:a14="http://schemas.microsoft.com/office/drawing/2010/main" val="0"/>
+                </a:ext>
+              </a:extLst>
+            </a:blip>
+            <a:srcRect l="16983"/>
+            <a:stretch/>
+          </p:blipFill>
+          <p:spPr>
+            <a:xfrm>
+              <a:off x="2682581" y="421111"/>
+              <a:ext cx="7069518" cy="3740342"/>
+            </a:xfrm>
+            <a:prstGeom prst="rect">
+              <a:avLst/>
+            </a:prstGeom>
+          </p:spPr>
+        </p:pic>
+        <p:sp>
+          <p:nvSpPr>
+            <p:cNvPr id="6" name="Rectangle 5">
+              <a:extLst>
+                <a:ext uri="{FF2B5EF4-FFF2-40B4-BE49-F238E27FC236}">
+                  <a16:creationId xmlns:a16="http://schemas.microsoft.com/office/drawing/2014/main" id="{07E47703-5404-4B98-97EE-3FE3C2303708}"/>
+                </a:ext>
+              </a:extLst>
+            </p:cNvPr>
+            <p:cNvSpPr/>
+            <p:nvPr/>
+          </p:nvSpPr>
+          <p:spPr>
+            <a:xfrm>
+              <a:off x="4007526" y="3023735"/>
+              <a:ext cx="1343609" cy="475860"/>
+            </a:xfrm>
+            <a:prstGeom prst="rect">
+              <a:avLst/>
+            </a:prstGeom>
+            <a:noFill/>
+            <a:ln w="38100">
+              <a:solidFill>
+                <a:srgbClr val="FF0000"/>
+              </a:solidFill>
+            </a:ln>
+          </p:spPr>
+          <p:style>
+            <a:lnRef idx="2">
+              <a:schemeClr val="accent1">
+                <a:shade val="50000"/>
+              </a:schemeClr>
+            </a:lnRef>
+            <a:fillRef idx="1">
+              <a:schemeClr val="accent1"/>
+            </a:fillRef>
+            <a:effectRef idx="0">
+              <a:schemeClr val="accent1"/>
+            </a:effectRef>
+            <a:fontRef idx="minor">
+              <a:schemeClr val="lt1"/>
+            </a:fontRef>
+          </p:style>
+          <p:txBody>
+            <a:bodyPr rtlCol="0" anchor="ctr"/>
+            <a:lstStyle/>
+            <a:p>
+              <a:pPr algn="ctr"/>
+              <a:endParaRPr lang="en-SG" dirty="0"/>
+            </a:p>
+          </p:txBody>
+        </p:sp>
+        <p:sp>
+          <p:nvSpPr>
+            <p:cNvPr id="7" name="Rectangle 6">
+              <a:extLst>
+                <a:ext uri="{FF2B5EF4-FFF2-40B4-BE49-F238E27FC236}">
+                  <a16:creationId xmlns:a16="http://schemas.microsoft.com/office/drawing/2014/main" id="{60628620-FA30-4F1B-B747-BBE3DBB7D323}"/>
+                </a:ext>
+              </a:extLst>
+            </p:cNvPr>
+            <p:cNvSpPr/>
+            <p:nvPr/>
+          </p:nvSpPr>
+          <p:spPr>
+            <a:xfrm>
+              <a:off x="5351135" y="3023735"/>
+              <a:ext cx="1343609" cy="475860"/>
+            </a:xfrm>
+            <a:prstGeom prst="rect">
+              <a:avLst/>
+            </a:prstGeom>
+            <a:noFill/>
+            <a:ln w="38100">
+              <a:solidFill>
+                <a:srgbClr val="FF0000"/>
+              </a:solidFill>
+            </a:ln>
+          </p:spPr>
+          <p:style>
+            <a:lnRef idx="2">
+              <a:schemeClr val="accent1">
+                <a:shade val="50000"/>
+              </a:schemeClr>
+            </a:lnRef>
+            <a:fillRef idx="1">
+              <a:schemeClr val="accent1"/>
+            </a:fillRef>
+            <a:effectRef idx="0">
+              <a:schemeClr val="accent1"/>
+            </a:effectRef>
+            <a:fontRef idx="minor">
+              <a:schemeClr val="lt1"/>
+            </a:fontRef>
+          </p:style>
+          <p:txBody>
+            <a:bodyPr rtlCol="0" anchor="ctr"/>
+            <a:lstStyle/>
+            <a:p>
+              <a:pPr algn="ctr"/>
+              <a:endParaRPr lang="en-SG" dirty="0"/>
+            </a:p>
+          </p:txBody>
+        </p:sp>
+        <p:sp>
+          <p:nvSpPr>
+            <p:cNvPr id="8" name="Rectangle 7">
+              <a:extLst>
+                <a:ext uri="{FF2B5EF4-FFF2-40B4-BE49-F238E27FC236}">
+                  <a16:creationId xmlns:a16="http://schemas.microsoft.com/office/drawing/2014/main" id="{B9CACB4A-5BAC-42F6-A2AA-68F573914565}"/>
+                </a:ext>
+              </a:extLst>
+            </p:cNvPr>
+            <p:cNvSpPr/>
+            <p:nvPr/>
+          </p:nvSpPr>
+          <p:spPr>
+            <a:xfrm>
+              <a:off x="3914221" y="3499595"/>
+              <a:ext cx="2864497" cy="661858"/>
+            </a:xfrm>
+            <a:prstGeom prst="rect">
+              <a:avLst/>
+            </a:prstGeom>
+            <a:noFill/>
+            <a:ln w="38100">
+              <a:solidFill>
+                <a:srgbClr val="FF0000"/>
+              </a:solidFill>
+            </a:ln>
+          </p:spPr>
+          <p:style>
+            <a:lnRef idx="2">
+              <a:schemeClr val="accent1">
+                <a:shade val="50000"/>
+              </a:schemeClr>
+            </a:lnRef>
+            <a:fillRef idx="1">
+              <a:schemeClr val="accent1"/>
+            </a:fillRef>
+            <a:effectRef idx="0">
+              <a:schemeClr val="accent1"/>
+            </a:effectRef>
+            <a:fontRef idx="minor">
+              <a:schemeClr val="lt1"/>
+            </a:fontRef>
+          </p:style>
+          <p:txBody>
+            <a:bodyPr rtlCol="0" anchor="ctr"/>
+            <a:lstStyle/>
+            <a:p>
+              <a:pPr algn="ctr"/>
+              <a:endParaRPr lang="en-SG" dirty="0"/>
+            </a:p>
+          </p:txBody>
+        </p:sp>
+        <p:pic>
+          <p:nvPicPr>
+            <p:cNvPr id="10" name="Picture 9" descr="Graphical user interface, text, application&#10;&#10;Description automatically generated">
+              <a:extLst>
+                <a:ext uri="{FF2B5EF4-FFF2-40B4-BE49-F238E27FC236}">
+                  <a16:creationId xmlns:a16="http://schemas.microsoft.com/office/drawing/2014/main" id="{DA587DED-0D8A-4783-9D38-99FAA5AFBD53}"/>
+                </a:ext>
+              </a:extLst>
+            </p:cNvPr>
+            <p:cNvPicPr>
+              <a:picLocks noChangeAspect="1"/>
+            </p:cNvPicPr>
+            <p:nvPr/>
+          </p:nvPicPr>
+          <p:blipFill>
+            <a:blip r:embed="rId3">
+              <a:extLst>
+                <a:ext uri="{28A0092B-C50C-407E-A947-70E740481C1C}">
+                  <a14:useLocalDpi xmlns:a14="http://schemas.microsoft.com/office/drawing/2010/main" val="0"/>
+                </a:ext>
+              </a:extLst>
+            </a:blip>
+            <a:stretch>
+              <a:fillRect/>
+            </a:stretch>
+          </p:blipFill>
+          <p:spPr>
+            <a:xfrm>
+              <a:off x="1066663" y="3114927"/>
+              <a:ext cx="1303906" cy="1772591"/>
+            </a:xfrm>
+            <a:prstGeom prst="rect">
+              <a:avLst/>
+            </a:prstGeom>
+          </p:spPr>
+        </p:pic>
+        <p:pic>
+          <p:nvPicPr>
+            <p:cNvPr id="12" name="Picture 11" descr="Graphical user interface, application, Teams&#10;&#10;Description automatically generated">
+              <a:extLst>
+                <a:ext uri="{FF2B5EF4-FFF2-40B4-BE49-F238E27FC236}">
+                  <a16:creationId xmlns:a16="http://schemas.microsoft.com/office/drawing/2014/main" id="{25D03D2E-DDF6-4F1B-AA6C-FEF0417209D5}"/>
+                </a:ext>
+              </a:extLst>
+            </p:cNvPr>
+            <p:cNvPicPr>
+              <a:picLocks noChangeAspect="1"/>
+            </p:cNvPicPr>
+            <p:nvPr/>
+          </p:nvPicPr>
+          <p:blipFill rotWithShape="1">
+            <a:blip r:embed="rId4">
+              <a:extLst>
+                <a:ext uri="{28A0092B-C50C-407E-A947-70E740481C1C}">
+                  <a14:useLocalDpi xmlns:a14="http://schemas.microsoft.com/office/drawing/2010/main" val="0"/>
+                </a:ext>
+              </a:extLst>
+            </a:blip>
+            <a:srcRect l="1590"/>
+            <a:stretch/>
+          </p:blipFill>
+          <p:spPr>
+            <a:xfrm>
+              <a:off x="1418323" y="602441"/>
+              <a:ext cx="1242109" cy="2283665"/>
+            </a:xfrm>
+            <a:prstGeom prst="rect">
+              <a:avLst/>
+            </a:prstGeom>
+          </p:spPr>
+        </p:pic>
+        <p:cxnSp>
+          <p:nvCxnSpPr>
+            <p:cNvPr id="13" name="Straight Arrow Connector 12">
+              <a:extLst>
+                <a:ext uri="{FF2B5EF4-FFF2-40B4-BE49-F238E27FC236}">
+                  <a16:creationId xmlns:a16="http://schemas.microsoft.com/office/drawing/2014/main" id="{970484E9-7056-4601-800C-542CD013997A}"/>
+                </a:ext>
+              </a:extLst>
+            </p:cNvPr>
+            <p:cNvCxnSpPr>
+              <a:cxnSpLocks/>
+              <a:stCxn id="6" idx="1"/>
+              <a:endCxn id="10" idx="3"/>
+            </p:cNvCxnSpPr>
+            <p:nvPr/>
+          </p:nvCxnSpPr>
+          <p:spPr>
+            <a:xfrm flipH="1">
+              <a:off x="2370569" y="3261665"/>
+              <a:ext cx="1636957" cy="739558"/>
+            </a:xfrm>
+            <a:prstGeom prst="straightConnector1">
+              <a:avLst/>
+            </a:prstGeom>
+            <a:ln w="28575">
+              <a:solidFill>
+                <a:srgbClr val="FF0000"/>
+              </a:solidFill>
+              <a:tailEnd type="triangle"/>
+            </a:ln>
+          </p:spPr>
+          <p:style>
+            <a:lnRef idx="1">
+              <a:schemeClr val="accent1"/>
+            </a:lnRef>
+            <a:fillRef idx="0">
+              <a:schemeClr val="accent1"/>
+            </a:fillRef>
+            <a:effectRef idx="0">
+              <a:schemeClr val="accent1"/>
+            </a:effectRef>
+            <a:fontRef idx="minor">
+              <a:schemeClr val="tx1"/>
+            </a:fontRef>
+          </p:style>
+        </p:cxnSp>
+        <p:cxnSp>
+          <p:nvCxnSpPr>
+            <p:cNvPr id="16" name="Straight Arrow Connector 15">
+              <a:extLst>
+                <a:ext uri="{FF2B5EF4-FFF2-40B4-BE49-F238E27FC236}">
+                  <a16:creationId xmlns:a16="http://schemas.microsoft.com/office/drawing/2014/main" id="{4D045527-3761-4C8D-97B1-3AF4A6AA7765}"/>
+                </a:ext>
+              </a:extLst>
+            </p:cNvPr>
+            <p:cNvCxnSpPr>
+              <a:cxnSpLocks/>
+              <a:stCxn id="7" idx="0"/>
+              <a:endCxn id="12" idx="3"/>
+            </p:cNvCxnSpPr>
+            <p:nvPr/>
+          </p:nvCxnSpPr>
+          <p:spPr>
+            <a:xfrm flipH="1" flipV="1">
+              <a:off x="2660432" y="1744274"/>
+              <a:ext cx="3362508" cy="1279461"/>
+            </a:xfrm>
+            <a:prstGeom prst="straightConnector1">
+              <a:avLst/>
+            </a:prstGeom>
+            <a:ln w="28575">
+              <a:solidFill>
+                <a:srgbClr val="FF0000"/>
+              </a:solidFill>
+              <a:tailEnd type="triangle"/>
+            </a:ln>
+          </p:spPr>
+          <p:style>
+            <a:lnRef idx="1">
+              <a:schemeClr val="accent1"/>
+            </a:lnRef>
+            <a:fillRef idx="0">
+              <a:schemeClr val="accent1"/>
+            </a:fillRef>
+            <a:effectRef idx="0">
+              <a:schemeClr val="accent1"/>
+            </a:effectRef>
+            <a:fontRef idx="minor">
+              <a:schemeClr val="tx1"/>
+            </a:fontRef>
+          </p:style>
+        </p:cxnSp>
+        <p:sp>
+          <p:nvSpPr>
+            <p:cNvPr id="43" name="Oval 42">
+              <a:extLst>
+                <a:ext uri="{FF2B5EF4-FFF2-40B4-BE49-F238E27FC236}">
+                  <a16:creationId xmlns:a16="http://schemas.microsoft.com/office/drawing/2014/main" id="{1D83463B-5838-4D19-B73F-E16706F8DF98}"/>
+                </a:ext>
+              </a:extLst>
+            </p:cNvPr>
+            <p:cNvSpPr/>
+            <p:nvPr/>
+          </p:nvSpPr>
+          <p:spPr>
+            <a:xfrm>
+              <a:off x="1197853" y="460460"/>
+              <a:ext cx="220470" cy="211750"/>
+            </a:xfrm>
+            <a:prstGeom prst="ellipse">
+              <a:avLst/>
+            </a:prstGeom>
+            <a:solidFill>
+              <a:schemeClr val="bg1"/>
+            </a:solidFill>
+            <a:ln w="12700">
+              <a:solidFill>
+                <a:schemeClr val="tx2"/>
+              </a:solidFill>
+            </a:ln>
+          </p:spPr>
+          <p:style>
+            <a:lnRef idx="2">
+              <a:schemeClr val="accent1">
+                <a:shade val="50000"/>
+              </a:schemeClr>
+            </a:lnRef>
+            <a:fillRef idx="1">
+              <a:schemeClr val="accent1"/>
+            </a:fillRef>
+            <a:effectRef idx="0">
+              <a:schemeClr val="accent1"/>
+            </a:effectRef>
+            <a:fontRef idx="minor">
+              <a:schemeClr val="lt1"/>
+            </a:fontRef>
+          </p:style>
+          <p:txBody>
+            <a:bodyPr rtlCol="0" anchor="ctr"/>
+            <a:lstStyle/>
+            <a:p>
+              <a:pPr algn="ctr"/>
+              <a:r>
+                <a:rPr lang="en-SG" sz="1600" dirty="0">
+                  <a:solidFill>
+                    <a:schemeClr val="tx2"/>
+                  </a:solidFill>
+                </a:rPr>
+                <a:t>5</a:t>
+              </a:r>
+            </a:p>
+          </p:txBody>
+        </p:sp>
+        <p:sp>
+          <p:nvSpPr>
+            <p:cNvPr id="44" name="Oval 43">
+              <a:extLst>
+                <a:ext uri="{FF2B5EF4-FFF2-40B4-BE49-F238E27FC236}">
+                  <a16:creationId xmlns:a16="http://schemas.microsoft.com/office/drawing/2014/main" id="{81F1673C-A5D6-4CF8-AE9E-BEBA353F8A31}"/>
+                </a:ext>
+              </a:extLst>
+            </p:cNvPr>
+            <p:cNvSpPr/>
+            <p:nvPr/>
+          </p:nvSpPr>
+          <p:spPr>
+            <a:xfrm>
+              <a:off x="3792912" y="3533444"/>
+              <a:ext cx="220470" cy="211750"/>
+            </a:xfrm>
+            <a:prstGeom prst="ellipse">
+              <a:avLst/>
+            </a:prstGeom>
+            <a:solidFill>
+              <a:schemeClr val="bg1"/>
+            </a:solidFill>
+            <a:ln w="12700">
+              <a:solidFill>
+                <a:schemeClr val="tx2"/>
+              </a:solidFill>
+            </a:ln>
+          </p:spPr>
+          <p:style>
+            <a:lnRef idx="2">
+              <a:schemeClr val="accent1">
+                <a:shade val="50000"/>
+              </a:schemeClr>
+            </a:lnRef>
+            <a:fillRef idx="1">
+              <a:schemeClr val="accent1"/>
+            </a:fillRef>
+            <a:effectRef idx="0">
+              <a:schemeClr val="accent1"/>
+            </a:effectRef>
+            <a:fontRef idx="minor">
+              <a:schemeClr val="lt1"/>
+            </a:fontRef>
+          </p:style>
+          <p:txBody>
+            <a:bodyPr rtlCol="0" anchor="ctr"/>
+            <a:lstStyle/>
+            <a:p>
+              <a:pPr algn="ctr"/>
+              <a:r>
+                <a:rPr lang="en-SG" sz="1600" dirty="0">
+                  <a:solidFill>
+                    <a:schemeClr val="tx2"/>
+                  </a:solidFill>
+                </a:rPr>
+                <a:t>6</a:t>
+              </a:r>
+            </a:p>
+          </p:txBody>
+        </p:sp>
+        <p:sp>
+          <p:nvSpPr>
+            <p:cNvPr id="45" name="Rectangle 44">
+              <a:extLst>
+                <a:ext uri="{FF2B5EF4-FFF2-40B4-BE49-F238E27FC236}">
+                  <a16:creationId xmlns:a16="http://schemas.microsoft.com/office/drawing/2014/main" id="{D80D61B2-B685-438B-A634-CD523D8C9BD7}"/>
+                </a:ext>
+              </a:extLst>
+            </p:cNvPr>
+            <p:cNvSpPr/>
+            <p:nvPr/>
+          </p:nvSpPr>
+          <p:spPr>
+            <a:xfrm>
+              <a:off x="6844831" y="3023735"/>
+              <a:ext cx="1343609" cy="475860"/>
+            </a:xfrm>
+            <a:prstGeom prst="rect">
+              <a:avLst/>
+            </a:prstGeom>
+            <a:noFill/>
+            <a:ln w="38100">
+              <a:solidFill>
+                <a:srgbClr val="FF0000"/>
+              </a:solidFill>
+            </a:ln>
+          </p:spPr>
+          <p:style>
+            <a:lnRef idx="2">
+              <a:schemeClr val="accent1">
+                <a:shade val="50000"/>
+              </a:schemeClr>
+            </a:lnRef>
+            <a:fillRef idx="1">
+              <a:schemeClr val="accent1"/>
+            </a:fillRef>
+            <a:effectRef idx="0">
+              <a:schemeClr val="accent1"/>
+            </a:effectRef>
+            <a:fontRef idx="minor">
+              <a:schemeClr val="lt1"/>
+            </a:fontRef>
+          </p:style>
+          <p:txBody>
+            <a:bodyPr rtlCol="0" anchor="ctr"/>
+            <a:lstStyle/>
+            <a:p>
+              <a:pPr algn="ctr"/>
+              <a:endParaRPr lang="en-SG" dirty="0"/>
+            </a:p>
+          </p:txBody>
+        </p:sp>
+        <p:sp>
+          <p:nvSpPr>
+            <p:cNvPr id="46" name="Rectangle 45">
+              <a:extLst>
+                <a:ext uri="{FF2B5EF4-FFF2-40B4-BE49-F238E27FC236}">
+                  <a16:creationId xmlns:a16="http://schemas.microsoft.com/office/drawing/2014/main" id="{D58D0863-511B-4DFD-B442-17BCAAC4F11A}"/>
+                </a:ext>
+              </a:extLst>
+            </p:cNvPr>
+            <p:cNvSpPr/>
+            <p:nvPr/>
+          </p:nvSpPr>
+          <p:spPr>
+            <a:xfrm>
+              <a:off x="8230560" y="3023735"/>
+              <a:ext cx="1343609" cy="475860"/>
+            </a:xfrm>
+            <a:prstGeom prst="rect">
+              <a:avLst/>
+            </a:prstGeom>
+            <a:noFill/>
+            <a:ln w="38100">
+              <a:solidFill>
+                <a:srgbClr val="FF0000"/>
+              </a:solidFill>
+            </a:ln>
+          </p:spPr>
+          <p:style>
+            <a:lnRef idx="2">
+              <a:schemeClr val="accent1">
+                <a:shade val="50000"/>
+              </a:schemeClr>
+            </a:lnRef>
+            <a:fillRef idx="1">
+              <a:schemeClr val="accent1"/>
+            </a:fillRef>
+            <a:effectRef idx="0">
+              <a:schemeClr val="accent1"/>
+            </a:effectRef>
+            <a:fontRef idx="minor">
+              <a:schemeClr val="lt1"/>
+            </a:fontRef>
+          </p:style>
+          <p:txBody>
+            <a:bodyPr rtlCol="0" anchor="ctr"/>
+            <a:lstStyle/>
+            <a:p>
+              <a:pPr algn="ctr"/>
+              <a:endParaRPr lang="en-SG" dirty="0"/>
+            </a:p>
+          </p:txBody>
+        </p:sp>
+        <p:pic>
+          <p:nvPicPr>
+            <p:cNvPr id="50" name="Picture 49" descr="Graphical user interface, application&#10;&#10;Description automatically generated">
+              <a:extLst>
+                <a:ext uri="{FF2B5EF4-FFF2-40B4-BE49-F238E27FC236}">
+                  <a16:creationId xmlns:a16="http://schemas.microsoft.com/office/drawing/2014/main" id="{82EC3A00-AE05-450B-8174-94274C83C28F}"/>
+                </a:ext>
+              </a:extLst>
+            </p:cNvPr>
+            <p:cNvPicPr>
+              <a:picLocks noChangeAspect="1"/>
+            </p:cNvPicPr>
+            <p:nvPr/>
+          </p:nvPicPr>
+          <p:blipFill>
+            <a:blip r:embed="rId5">
+              <a:extLst>
+                <a:ext uri="{28A0092B-C50C-407E-A947-70E740481C1C}">
+                  <a14:useLocalDpi xmlns:a14="http://schemas.microsoft.com/office/drawing/2010/main" val="0"/>
+                </a:ext>
+              </a:extLst>
+            </a:blip>
+            <a:stretch>
+              <a:fillRect/>
+            </a:stretch>
+          </p:blipFill>
+          <p:spPr>
+            <a:xfrm>
+              <a:off x="9878322" y="948069"/>
+              <a:ext cx="1275102" cy="1592408"/>
+            </a:xfrm>
+            <a:prstGeom prst="rect">
+              <a:avLst/>
+            </a:prstGeom>
+          </p:spPr>
+        </p:pic>
+        <p:sp>
+          <p:nvSpPr>
+            <p:cNvPr id="51" name="Oval 50">
+              <a:extLst>
+                <a:ext uri="{FF2B5EF4-FFF2-40B4-BE49-F238E27FC236}">
+                  <a16:creationId xmlns:a16="http://schemas.microsoft.com/office/drawing/2014/main" id="{230FE81A-A095-43A3-A436-DCD41FF8CA99}"/>
+                </a:ext>
+              </a:extLst>
+            </p:cNvPr>
+            <p:cNvSpPr/>
+            <p:nvPr/>
+          </p:nvSpPr>
+          <p:spPr>
+            <a:xfrm>
+              <a:off x="881385" y="3023735"/>
+              <a:ext cx="220470" cy="211750"/>
+            </a:xfrm>
+            <a:prstGeom prst="ellipse">
+              <a:avLst/>
+            </a:prstGeom>
+            <a:solidFill>
+              <a:schemeClr val="bg1"/>
+            </a:solidFill>
+            <a:ln w="12700">
+              <a:solidFill>
+                <a:schemeClr val="tx2"/>
+              </a:solidFill>
+            </a:ln>
+          </p:spPr>
+          <p:style>
+            <a:lnRef idx="2">
+              <a:schemeClr val="accent1">
+                <a:shade val="50000"/>
+              </a:schemeClr>
+            </a:lnRef>
+            <a:fillRef idx="1">
+              <a:schemeClr val="accent1"/>
+            </a:fillRef>
+            <a:effectRef idx="0">
+              <a:schemeClr val="accent1"/>
+            </a:effectRef>
+            <a:fontRef idx="minor">
+              <a:schemeClr val="lt1"/>
+            </a:fontRef>
+          </p:style>
+          <p:txBody>
+            <a:bodyPr rtlCol="0" anchor="ctr"/>
+            <a:lstStyle/>
+            <a:p>
+              <a:pPr algn="ctr"/>
+              <a:r>
+                <a:rPr lang="en-SG" sz="1600" dirty="0">
+                  <a:solidFill>
+                    <a:schemeClr val="tx2"/>
+                  </a:solidFill>
+                </a:rPr>
+                <a:t>4</a:t>
+              </a:r>
+            </a:p>
+          </p:txBody>
+        </p:sp>
+        <p:sp>
+          <p:nvSpPr>
+            <p:cNvPr id="47" name="Oval 46">
+              <a:extLst>
+                <a:ext uri="{FF2B5EF4-FFF2-40B4-BE49-F238E27FC236}">
+                  <a16:creationId xmlns:a16="http://schemas.microsoft.com/office/drawing/2014/main" id="{E32C5620-4D2E-44B2-8C96-6434FB71E60F}"/>
+                </a:ext>
+              </a:extLst>
+            </p:cNvPr>
+            <p:cNvSpPr/>
+            <p:nvPr/>
+          </p:nvSpPr>
+          <p:spPr>
+            <a:xfrm>
+              <a:off x="11059177" y="842194"/>
+              <a:ext cx="220470" cy="211750"/>
+            </a:xfrm>
+            <a:prstGeom prst="ellipse">
+              <a:avLst/>
+            </a:prstGeom>
+            <a:solidFill>
+              <a:schemeClr val="bg1"/>
+            </a:solidFill>
+            <a:ln w="12700">
+              <a:solidFill>
+                <a:schemeClr val="tx2"/>
+              </a:solidFill>
+            </a:ln>
+          </p:spPr>
+          <p:style>
+            <a:lnRef idx="2">
+              <a:schemeClr val="accent1">
+                <a:shade val="50000"/>
+              </a:schemeClr>
+            </a:lnRef>
+            <a:fillRef idx="1">
+              <a:schemeClr val="accent1"/>
+            </a:fillRef>
+            <a:effectRef idx="0">
+              <a:schemeClr val="accent1"/>
+            </a:effectRef>
+            <a:fontRef idx="minor">
+              <a:schemeClr val="lt1"/>
+            </a:fontRef>
+          </p:style>
+          <p:txBody>
+            <a:bodyPr rtlCol="0" anchor="ctr"/>
+            <a:lstStyle/>
+            <a:p>
+              <a:pPr algn="ctr"/>
+              <a:r>
+                <a:rPr lang="en-SG" sz="1600" dirty="0">
+                  <a:solidFill>
+                    <a:schemeClr val="tx2"/>
+                  </a:solidFill>
+                </a:rPr>
+                <a:t>7</a:t>
+              </a:r>
+            </a:p>
+          </p:txBody>
+        </p:sp>
+        <p:cxnSp>
+          <p:nvCxnSpPr>
+            <p:cNvPr id="52" name="Straight Arrow Connector 51">
+              <a:extLst>
+                <a:ext uri="{FF2B5EF4-FFF2-40B4-BE49-F238E27FC236}">
+                  <a16:creationId xmlns:a16="http://schemas.microsoft.com/office/drawing/2014/main" id="{F418CB9A-EACB-41BD-A25B-7656C04907FD}"/>
+                </a:ext>
+              </a:extLst>
+            </p:cNvPr>
+            <p:cNvCxnSpPr>
+              <a:cxnSpLocks/>
+              <a:stCxn id="45" idx="0"/>
+              <a:endCxn id="50" idx="1"/>
+            </p:cNvCxnSpPr>
+            <p:nvPr/>
+          </p:nvCxnSpPr>
+          <p:spPr>
+            <a:xfrm flipV="1">
+              <a:off x="7516636" y="1744273"/>
+              <a:ext cx="2361686" cy="1279462"/>
+            </a:xfrm>
+            <a:prstGeom prst="straightConnector1">
+              <a:avLst/>
+            </a:prstGeom>
+            <a:ln w="28575">
+              <a:solidFill>
+                <a:srgbClr val="FF0000"/>
+              </a:solidFill>
+              <a:tailEnd type="triangle"/>
+            </a:ln>
+          </p:spPr>
+          <p:style>
+            <a:lnRef idx="1">
+              <a:schemeClr val="accent1"/>
+            </a:lnRef>
+            <a:fillRef idx="0">
+              <a:schemeClr val="accent1"/>
+            </a:fillRef>
+            <a:effectRef idx="0">
+              <a:schemeClr val="accent1"/>
+            </a:effectRef>
+            <a:fontRef idx="minor">
+              <a:schemeClr val="tx1"/>
+            </a:fontRef>
+          </p:style>
+        </p:cxnSp>
+        <p:pic>
+          <p:nvPicPr>
+            <p:cNvPr id="57" name="Picture 56" descr="Graphical user interface, text, application, chat or text message&#10;&#10;Description automatically generated">
+              <a:extLst>
+                <a:ext uri="{FF2B5EF4-FFF2-40B4-BE49-F238E27FC236}">
+                  <a16:creationId xmlns:a16="http://schemas.microsoft.com/office/drawing/2014/main" id="{B8BFCF2B-41F2-48E3-8698-8A4246305410}"/>
+                </a:ext>
+              </a:extLst>
+            </p:cNvPr>
+            <p:cNvPicPr>
+              <a:picLocks noChangeAspect="1"/>
+            </p:cNvPicPr>
+            <p:nvPr/>
+          </p:nvPicPr>
+          <p:blipFill>
+            <a:blip r:embed="rId6">
+              <a:extLst>
+                <a:ext uri="{28A0092B-C50C-407E-A947-70E740481C1C}">
+                  <a14:useLocalDpi xmlns:a14="http://schemas.microsoft.com/office/drawing/2010/main" val="0"/>
+                </a:ext>
+              </a:extLst>
+            </a:blip>
+            <a:stretch>
+              <a:fillRect/>
+            </a:stretch>
+          </p:blipFill>
+          <p:spPr>
+            <a:xfrm>
+              <a:off x="10394384" y="2691122"/>
+              <a:ext cx="1365320" cy="1847945"/>
+            </a:xfrm>
+            <a:prstGeom prst="rect">
+              <a:avLst/>
+            </a:prstGeom>
+          </p:spPr>
+        </p:pic>
+        <p:sp>
+          <p:nvSpPr>
+            <p:cNvPr id="48" name="Oval 47">
+              <a:extLst>
+                <a:ext uri="{FF2B5EF4-FFF2-40B4-BE49-F238E27FC236}">
+                  <a16:creationId xmlns:a16="http://schemas.microsoft.com/office/drawing/2014/main" id="{046F0019-5D28-48EB-BCE7-FC130D3993BB}"/>
+                </a:ext>
+              </a:extLst>
+            </p:cNvPr>
+            <p:cNvSpPr/>
+            <p:nvPr/>
+          </p:nvSpPr>
+          <p:spPr>
+            <a:xfrm>
+              <a:off x="11649469" y="2571570"/>
+              <a:ext cx="220470" cy="211750"/>
+            </a:xfrm>
+            <a:prstGeom prst="ellipse">
+              <a:avLst/>
+            </a:prstGeom>
+            <a:solidFill>
+              <a:schemeClr val="bg1"/>
+            </a:solidFill>
+            <a:ln w="12700">
+              <a:solidFill>
+                <a:schemeClr val="tx2"/>
+              </a:solidFill>
+            </a:ln>
+          </p:spPr>
+          <p:style>
+            <a:lnRef idx="2">
+              <a:schemeClr val="accent1">
+                <a:shade val="50000"/>
+              </a:schemeClr>
+            </a:lnRef>
+            <a:fillRef idx="1">
+              <a:schemeClr val="accent1"/>
+            </a:fillRef>
+            <a:effectRef idx="0">
+              <a:schemeClr val="accent1"/>
+            </a:effectRef>
+            <a:fontRef idx="minor">
+              <a:schemeClr val="lt1"/>
+            </a:fontRef>
+          </p:style>
+          <p:txBody>
+            <a:bodyPr rtlCol="0" anchor="ctr"/>
+            <a:lstStyle/>
+            <a:p>
+              <a:pPr algn="ctr"/>
+              <a:r>
+                <a:rPr lang="en-SG" sz="1600" dirty="0">
+                  <a:solidFill>
+                    <a:schemeClr val="tx2"/>
+                  </a:solidFill>
+                </a:rPr>
+                <a:t>8</a:t>
+              </a:r>
+            </a:p>
+          </p:txBody>
+        </p:sp>
+        <p:cxnSp>
+          <p:nvCxnSpPr>
+            <p:cNvPr id="58" name="Straight Arrow Connector 57">
+              <a:extLst>
+                <a:ext uri="{FF2B5EF4-FFF2-40B4-BE49-F238E27FC236}">
+                  <a16:creationId xmlns:a16="http://schemas.microsoft.com/office/drawing/2014/main" id="{253144EB-F1DC-45AD-ADE9-DF600936DB49}"/>
+                </a:ext>
+              </a:extLst>
+            </p:cNvPr>
+            <p:cNvCxnSpPr>
+              <a:cxnSpLocks/>
+              <a:stCxn id="46" idx="3"/>
+              <a:endCxn id="57" idx="1"/>
+            </p:cNvCxnSpPr>
+            <p:nvPr/>
+          </p:nvCxnSpPr>
+          <p:spPr>
+            <a:xfrm>
+              <a:off x="9574169" y="3261665"/>
+              <a:ext cx="820215" cy="353430"/>
+            </a:xfrm>
+            <a:prstGeom prst="straightConnector1">
+              <a:avLst/>
+            </a:prstGeom>
+            <a:ln w="28575">
+              <a:solidFill>
+                <a:srgbClr val="FF0000"/>
+              </a:solidFill>
+              <a:tailEnd type="triangle"/>
+            </a:ln>
+          </p:spPr>
+          <p:style>
+            <a:lnRef idx="1">
+              <a:schemeClr val="accent1"/>
+            </a:lnRef>
+            <a:fillRef idx="0">
+              <a:schemeClr val="accent1"/>
+            </a:fillRef>
+            <a:effectRef idx="0">
+              <a:schemeClr val="accent1"/>
+            </a:effectRef>
+            <a:fontRef idx="minor">
+              <a:schemeClr val="tx1"/>
+            </a:fontRef>
+          </p:style>
+        </p:cxnSp>
+        <p:sp>
+          <p:nvSpPr>
+            <p:cNvPr id="63" name="Rectangle 62">
+              <a:extLst>
+                <a:ext uri="{FF2B5EF4-FFF2-40B4-BE49-F238E27FC236}">
+                  <a16:creationId xmlns:a16="http://schemas.microsoft.com/office/drawing/2014/main" id="{26B987E2-F82E-4158-AAC0-BDB6021A4187}"/>
+                </a:ext>
+              </a:extLst>
+            </p:cNvPr>
+            <p:cNvSpPr/>
+            <p:nvPr/>
+          </p:nvSpPr>
+          <p:spPr>
+            <a:xfrm>
+              <a:off x="10416095" y="3825379"/>
+              <a:ext cx="1343609" cy="436228"/>
+            </a:xfrm>
+            <a:prstGeom prst="rect">
+              <a:avLst/>
+            </a:prstGeom>
+            <a:noFill/>
+            <a:ln w="19050">
+              <a:solidFill>
+                <a:srgbClr val="FF0000"/>
+              </a:solidFill>
+              <a:prstDash val="sysDash"/>
+            </a:ln>
+          </p:spPr>
+          <p:style>
+            <a:lnRef idx="2">
+              <a:schemeClr val="accent1">
+                <a:shade val="50000"/>
+              </a:schemeClr>
+            </a:lnRef>
+            <a:fillRef idx="1">
+              <a:schemeClr val="accent1"/>
+            </a:fillRef>
+            <a:effectRef idx="0">
+              <a:schemeClr val="accent1"/>
+            </a:effectRef>
+            <a:fontRef idx="minor">
+              <a:schemeClr val="lt1"/>
+            </a:fontRef>
+          </p:style>
+          <p:txBody>
+            <a:bodyPr rtlCol="0" anchor="ctr"/>
+            <a:lstStyle/>
+            <a:p>
+              <a:pPr algn="ctr"/>
+              <a:endParaRPr lang="en-SG" dirty="0"/>
+            </a:p>
+          </p:txBody>
+        </p:sp>
+        <p:sp>
+          <p:nvSpPr>
+            <p:cNvPr id="65" name="Rectangle 64">
+              <a:extLst>
+                <a:ext uri="{FF2B5EF4-FFF2-40B4-BE49-F238E27FC236}">
+                  <a16:creationId xmlns:a16="http://schemas.microsoft.com/office/drawing/2014/main" id="{28D38E5A-4580-4CCF-9A64-8C9DA1AA7B75}"/>
+                </a:ext>
+              </a:extLst>
+            </p:cNvPr>
+            <p:cNvSpPr/>
+            <p:nvPr/>
+          </p:nvSpPr>
+          <p:spPr>
+            <a:xfrm>
+              <a:off x="10416095" y="4263005"/>
+              <a:ext cx="1343609" cy="276062"/>
+            </a:xfrm>
+            <a:prstGeom prst="rect">
+              <a:avLst/>
+            </a:prstGeom>
+            <a:noFill/>
+            <a:ln w="19050">
+              <a:solidFill>
+                <a:srgbClr val="FF0000"/>
+              </a:solidFill>
+              <a:prstDash val="sysDash"/>
+            </a:ln>
+          </p:spPr>
+          <p:style>
+            <a:lnRef idx="2">
+              <a:schemeClr val="accent1">
+                <a:shade val="50000"/>
+              </a:schemeClr>
+            </a:lnRef>
+            <a:fillRef idx="1">
+              <a:schemeClr val="accent1"/>
+            </a:fillRef>
+            <a:effectRef idx="0">
+              <a:schemeClr val="accent1"/>
+            </a:effectRef>
+            <a:fontRef idx="minor">
+              <a:schemeClr val="lt1"/>
+            </a:fontRef>
+          </p:style>
+          <p:txBody>
+            <a:bodyPr rtlCol="0" anchor="ctr"/>
+            <a:lstStyle/>
+            <a:p>
+              <a:pPr algn="ctr"/>
+              <a:endParaRPr lang="en-SG" dirty="0"/>
+            </a:p>
+          </p:txBody>
+        </p:sp>
+        <p:cxnSp>
+          <p:nvCxnSpPr>
+            <p:cNvPr id="66" name="Straight Arrow Connector 65">
+              <a:extLst>
+                <a:ext uri="{FF2B5EF4-FFF2-40B4-BE49-F238E27FC236}">
+                  <a16:creationId xmlns:a16="http://schemas.microsoft.com/office/drawing/2014/main" id="{A4D052A8-6AF4-45D5-B0BE-7477BF571F8F}"/>
+                </a:ext>
+              </a:extLst>
+            </p:cNvPr>
+            <p:cNvCxnSpPr>
+              <a:cxnSpLocks/>
+              <a:stCxn id="63" idx="1"/>
+              <a:endCxn id="72" idx="0"/>
+            </p:cNvCxnSpPr>
+            <p:nvPr/>
+          </p:nvCxnSpPr>
+          <p:spPr>
+            <a:xfrm flipH="1">
+              <a:off x="8166930" y="4043493"/>
+              <a:ext cx="2249165" cy="1012715"/>
+            </a:xfrm>
+            <a:prstGeom prst="straightConnector1">
+              <a:avLst/>
+            </a:prstGeom>
+            <a:ln w="19050">
+              <a:solidFill>
+                <a:srgbClr val="FF0000"/>
+              </a:solidFill>
+              <a:prstDash val="sysDash"/>
+              <a:tailEnd type="triangle"/>
+            </a:ln>
+          </p:spPr>
+          <p:style>
+            <a:lnRef idx="1">
+              <a:schemeClr val="accent1"/>
+            </a:lnRef>
+            <a:fillRef idx="0">
+              <a:schemeClr val="accent1"/>
+            </a:fillRef>
+            <a:effectRef idx="0">
+              <a:schemeClr val="accent1"/>
+            </a:effectRef>
+            <a:fontRef idx="minor">
+              <a:schemeClr val="tx1"/>
+            </a:fontRef>
+          </p:style>
+        </p:cxnSp>
+        <p:pic>
+          <p:nvPicPr>
+            <p:cNvPr id="72" name="Picture 71" descr="Graphical user interface, text, application&#10;&#10;Description automatically generated">
+              <a:extLst>
+                <a:ext uri="{FF2B5EF4-FFF2-40B4-BE49-F238E27FC236}">
+                  <a16:creationId xmlns:a16="http://schemas.microsoft.com/office/drawing/2014/main" id="{177F7FDF-6076-4E2E-A4A0-49D8309B0F46}"/>
+                </a:ext>
+              </a:extLst>
+            </p:cNvPr>
+            <p:cNvPicPr>
+              <a:picLocks noChangeAspect="1"/>
+            </p:cNvPicPr>
+            <p:nvPr/>
+          </p:nvPicPr>
+          <p:blipFill>
+            <a:blip r:embed="rId7">
+              <a:extLst>
+                <a:ext uri="{28A0092B-C50C-407E-A947-70E740481C1C}">
+                  <a14:useLocalDpi xmlns:a14="http://schemas.microsoft.com/office/drawing/2010/main" val="0"/>
+                </a:ext>
+              </a:extLst>
+            </a:blip>
+            <a:stretch>
+              <a:fillRect/>
+            </a:stretch>
+          </p:blipFill>
+          <p:spPr>
+            <a:xfrm>
+              <a:off x="6932670" y="5056208"/>
+              <a:ext cx="2468519" cy="1202284"/>
+            </a:xfrm>
+            <a:prstGeom prst="rect">
+              <a:avLst/>
+            </a:prstGeom>
+          </p:spPr>
+        </p:pic>
+        <p:pic>
+          <p:nvPicPr>
+            <p:cNvPr id="76" name="Picture 75" descr="Graphical user interface, text, application&#10;&#10;Description automatically generated">
+              <a:extLst>
+                <a:ext uri="{FF2B5EF4-FFF2-40B4-BE49-F238E27FC236}">
+                  <a16:creationId xmlns:a16="http://schemas.microsoft.com/office/drawing/2014/main" id="{8E891C97-1408-41E6-A8A5-0B1795F0D864}"/>
+                </a:ext>
+              </a:extLst>
+            </p:cNvPr>
+            <p:cNvPicPr>
+              <a:picLocks noChangeAspect="1"/>
+            </p:cNvPicPr>
+            <p:nvPr/>
+          </p:nvPicPr>
+          <p:blipFill>
+            <a:blip r:embed="rId8">
+              <a:extLst>
+                <a:ext uri="{28A0092B-C50C-407E-A947-70E740481C1C}">
+                  <a14:useLocalDpi xmlns:a14="http://schemas.microsoft.com/office/drawing/2010/main" val="0"/>
+                </a:ext>
+              </a:extLst>
+            </a:blip>
+            <a:stretch>
+              <a:fillRect/>
+            </a:stretch>
+          </p:blipFill>
+          <p:spPr>
+            <a:xfrm>
+              <a:off x="9508669" y="5087199"/>
+              <a:ext cx="2468519" cy="1140302"/>
+            </a:xfrm>
+            <a:prstGeom prst="rect">
+              <a:avLst/>
+            </a:prstGeom>
+          </p:spPr>
+        </p:pic>
+        <p:cxnSp>
+          <p:nvCxnSpPr>
+            <p:cNvPr id="77" name="Straight Arrow Connector 76">
+              <a:extLst>
+                <a:ext uri="{FF2B5EF4-FFF2-40B4-BE49-F238E27FC236}">
+                  <a16:creationId xmlns:a16="http://schemas.microsoft.com/office/drawing/2014/main" id="{DF871E17-9E44-4C02-987E-54C61583BB4C}"/>
+                </a:ext>
+              </a:extLst>
+            </p:cNvPr>
+            <p:cNvCxnSpPr>
+              <a:cxnSpLocks/>
+              <a:stCxn id="65" idx="2"/>
+              <a:endCxn id="76" idx="0"/>
+            </p:cNvCxnSpPr>
+            <p:nvPr/>
+          </p:nvCxnSpPr>
+          <p:spPr>
+            <a:xfrm flipH="1">
+              <a:off x="10742929" y="4539067"/>
+              <a:ext cx="344971" cy="548132"/>
+            </a:xfrm>
+            <a:prstGeom prst="straightConnector1">
+              <a:avLst/>
+            </a:prstGeom>
+            <a:ln w="19050">
+              <a:solidFill>
+                <a:srgbClr val="FF0000"/>
+              </a:solidFill>
+              <a:prstDash val="sysDash"/>
+              <a:tailEnd type="triangle"/>
+            </a:ln>
+          </p:spPr>
+          <p:style>
+            <a:lnRef idx="1">
+              <a:schemeClr val="accent1"/>
+            </a:lnRef>
+            <a:fillRef idx="0">
+              <a:schemeClr val="accent1"/>
+            </a:fillRef>
+            <a:effectRef idx="0">
+              <a:schemeClr val="accent1"/>
+            </a:effectRef>
+            <a:fontRef idx="minor">
+              <a:schemeClr val="tx1"/>
+            </a:fontRef>
+          </p:style>
+        </p:cxnSp>
+        <p:pic>
+          <p:nvPicPr>
+            <p:cNvPr id="83" name="Picture 82" descr="Diagram, map&#10;&#10;Description automatically generated">
+              <a:extLst>
+                <a:ext uri="{FF2B5EF4-FFF2-40B4-BE49-F238E27FC236}">
+                  <a16:creationId xmlns:a16="http://schemas.microsoft.com/office/drawing/2014/main" id="{9FFE4AB2-B306-44E6-8F93-DDC19BD5DB6C}"/>
+                </a:ext>
+              </a:extLst>
+            </p:cNvPr>
+            <p:cNvPicPr>
+              <a:picLocks noChangeAspect="1"/>
+            </p:cNvPicPr>
+            <p:nvPr/>
+          </p:nvPicPr>
+          <p:blipFill rotWithShape="1">
+            <a:blip r:embed="rId9">
+              <a:extLst>
+                <a:ext uri="{28A0092B-C50C-407E-A947-70E740481C1C}">
+                  <a14:useLocalDpi xmlns:a14="http://schemas.microsoft.com/office/drawing/2010/main" val="0"/>
+                </a:ext>
+              </a:extLst>
+            </a:blip>
+            <a:srcRect t="79343"/>
+            <a:stretch/>
+          </p:blipFill>
+          <p:spPr>
+            <a:xfrm>
+              <a:off x="2854422" y="5319315"/>
+              <a:ext cx="2306207" cy="676069"/>
+            </a:xfrm>
+            <a:prstGeom prst="rect">
+              <a:avLst/>
+            </a:prstGeom>
+          </p:spPr>
+        </p:pic>
+        <p:sp>
+          <p:nvSpPr>
+            <p:cNvPr id="84" name="Rectangle 83">
+              <a:extLst>
+                <a:ext uri="{FF2B5EF4-FFF2-40B4-BE49-F238E27FC236}">
+                  <a16:creationId xmlns:a16="http://schemas.microsoft.com/office/drawing/2014/main" id="{FA97F791-5FF8-4B00-A9DC-375CD5D50C43}"/>
+                </a:ext>
+              </a:extLst>
+            </p:cNvPr>
+            <p:cNvSpPr/>
+            <p:nvPr/>
+          </p:nvSpPr>
+          <p:spPr>
+            <a:xfrm>
+              <a:off x="1155908" y="4182922"/>
+              <a:ext cx="949730" cy="640748"/>
+            </a:xfrm>
+            <a:prstGeom prst="rect">
+              <a:avLst/>
+            </a:prstGeom>
+            <a:noFill/>
+            <a:ln w="19050">
+              <a:solidFill>
+                <a:srgbClr val="FF0000"/>
+              </a:solidFill>
+              <a:prstDash val="sysDash"/>
+            </a:ln>
+          </p:spPr>
+          <p:style>
+            <a:lnRef idx="2">
+              <a:schemeClr val="accent1">
+                <a:shade val="50000"/>
+              </a:schemeClr>
+            </a:lnRef>
+            <a:fillRef idx="1">
+              <a:schemeClr val="accent1"/>
+            </a:fillRef>
+            <a:effectRef idx="0">
+              <a:schemeClr val="accent1"/>
+            </a:effectRef>
+            <a:fontRef idx="minor">
+              <a:schemeClr val="lt1"/>
+            </a:fontRef>
+          </p:style>
+          <p:txBody>
+            <a:bodyPr rtlCol="0" anchor="ctr"/>
+            <a:lstStyle/>
+            <a:p>
+              <a:pPr algn="ctr"/>
+              <a:endParaRPr lang="en-SG" dirty="0"/>
+            </a:p>
+          </p:txBody>
+        </p:sp>
+        <p:cxnSp>
+          <p:nvCxnSpPr>
+            <p:cNvPr id="85" name="Straight Arrow Connector 84">
+              <a:extLst>
+                <a:ext uri="{FF2B5EF4-FFF2-40B4-BE49-F238E27FC236}">
+                  <a16:creationId xmlns:a16="http://schemas.microsoft.com/office/drawing/2014/main" id="{2266E171-F680-4F28-8B4F-AF295FC15A9C}"/>
+                </a:ext>
+              </a:extLst>
+            </p:cNvPr>
+            <p:cNvCxnSpPr>
+              <a:cxnSpLocks/>
+              <a:stCxn id="84" idx="3"/>
+              <a:endCxn id="83" idx="1"/>
+            </p:cNvCxnSpPr>
+            <p:nvPr/>
+          </p:nvCxnSpPr>
+          <p:spPr>
+            <a:xfrm>
+              <a:off x="2105638" y="4503296"/>
+              <a:ext cx="748784" cy="1154054"/>
+            </a:xfrm>
+            <a:prstGeom prst="straightConnector1">
+              <a:avLst/>
+            </a:prstGeom>
+            <a:ln w="19050">
+              <a:solidFill>
+                <a:srgbClr val="FF0000"/>
+              </a:solidFill>
+              <a:prstDash val="sysDash"/>
+              <a:tailEnd type="triangle"/>
+            </a:ln>
+          </p:spPr>
+          <p:style>
+            <a:lnRef idx="1">
+              <a:schemeClr val="accent1"/>
+            </a:lnRef>
+            <a:fillRef idx="0">
+              <a:schemeClr val="accent1"/>
+            </a:fillRef>
+            <a:effectRef idx="0">
+              <a:schemeClr val="accent1"/>
+            </a:effectRef>
+            <a:fontRef idx="minor">
+              <a:schemeClr val="tx1"/>
+            </a:fontRef>
+          </p:style>
+        </p:cxnSp>
+      </p:grpSp>
+    </p:spTree>
+    <p:extLst>
+      <p:ext uri="{BB962C8B-B14F-4D97-AF65-F5344CB8AC3E}">
+        <p14:creationId xmlns:p14="http://schemas.microsoft.com/office/powerpoint/2010/main" val="941998066"/>
       </p:ext>
     </p:extLst>
   </p:cSld>

</xml_diff>